<commit_message>
Updated power point & rolling deck
</commit_message>
<xml_diff>
--- a/NewCC2015.AzureSearch.pptx
+++ b/NewCC2015.AzureSearch.pptx
@@ -6,10 +6,10 @@
     <p:sldMasterId id="2147483697" r:id="rId5"/>
   </p:sldMasterIdLst>
   <p:notesMasterIdLst>
-    <p:notesMasterId r:id="rId25"/>
+    <p:notesMasterId r:id="rId26"/>
   </p:notesMasterIdLst>
   <p:handoutMasterIdLst>
-    <p:handoutMasterId r:id="rId26"/>
+    <p:handoutMasterId r:id="rId27"/>
   </p:handoutMasterIdLst>
   <p:sldIdLst>
     <p:sldId id="294" r:id="rId6"/>
@@ -29,8 +29,9 @@
     <p:sldId id="307" r:id="rId20"/>
     <p:sldId id="308" r:id="rId21"/>
     <p:sldId id="309" r:id="rId22"/>
-    <p:sldId id="291" r:id="rId23"/>
-    <p:sldId id="290" r:id="rId24"/>
+    <p:sldId id="290" r:id="rId23"/>
+    <p:sldId id="291" r:id="rId24"/>
+    <p:sldId id="310" r:id="rId25"/>
   </p:sldIdLst>
   <p:sldSz cx="12192000" cy="6858000"/>
   <p:notesSz cx="6858000" cy="9144000"/>
@@ -230,7 +231,7 @@
           <a:p>
             <a:fld id="{E3EB2289-A828-4404-981E-3915472D04E1}" type="datetimeFigureOut">
               <a:rPr lang="en-US" smtClean="0"/>
-              <a:t>3/27/2015</a:t>
+              <a:t>3/28/2015</a:t>
             </a:fld>
             <a:endParaRPr lang="en-US" dirty="0"/>
           </a:p>
@@ -396,7 +397,7 @@
           <a:p>
             <a:fld id="{4D9C8474-F087-4731-8F56-9C772D037AED}" type="datetimeFigureOut">
               <a:rPr lang="en-US" smtClean="0"/>
-              <a:t>3/27/2015</a:t>
+              <a:t>3/28/2015</a:t>
             </a:fld>
             <a:endParaRPr lang="en-US" dirty="0"/>
           </a:p>
@@ -709,7 +710,114 @@
           <a:bodyPr/>
           <a:lstStyle/>
           <a:p>
-            <a:endParaRPr lang="en-US" dirty="0"/>
+            <a:r>
+              <a:rPr lang="en-US" dirty="0" smtClean="0"/>
+              <a:t>Technologies</a:t>
+            </a:r>
+            <a:endParaRPr lang="en-US" baseline="0" dirty="0" smtClean="0"/>
+          </a:p>
+          <a:p>
+            <a:endParaRPr lang="en-US" baseline="0" dirty="0" smtClean="0"/>
+          </a:p>
+          <a:p>
+            <a:r>
+              <a:rPr lang="en-US" baseline="0" dirty="0" smtClean="0"/>
+              <a:t>Database</a:t>
+            </a:r>
+          </a:p>
+          <a:p>
+            <a:r>
+              <a:rPr lang="en-US" baseline="0" dirty="0" smtClean="0"/>
+              <a:t>SQL </a:t>
+            </a:r>
+            <a:r>
+              <a:rPr lang="en-US" baseline="0" dirty="0" smtClean="0"/>
+              <a:t>Server, </a:t>
+            </a:r>
+            <a:r>
+              <a:rPr lang="en-US" baseline="0" dirty="0" err="1" smtClean="0"/>
+              <a:t>MySql</a:t>
+            </a:r>
+            <a:r>
+              <a:rPr lang="en-US" baseline="0" dirty="0" smtClean="0"/>
+              <a:t>, Oracle, Access, </a:t>
+            </a:r>
+            <a:r>
+              <a:rPr lang="en-US" baseline="0" dirty="0" smtClean="0"/>
+              <a:t>Excel</a:t>
+            </a:r>
+          </a:p>
+          <a:p>
+            <a:endParaRPr lang="en-US" baseline="0" dirty="0" smtClean="0"/>
+          </a:p>
+          <a:p>
+            <a:r>
+              <a:rPr lang="en-US" baseline="0" dirty="0" smtClean="0"/>
+              <a:t>Azure</a:t>
+            </a:r>
+          </a:p>
+          <a:p>
+            <a:r>
+              <a:rPr lang="en-US" baseline="0" dirty="0" smtClean="0"/>
+              <a:t>Event Hubs, </a:t>
+            </a:r>
+            <a:r>
+              <a:rPr lang="en-US" baseline="0" dirty="0" err="1" smtClean="0"/>
+              <a:t>DocumentDB</a:t>
+            </a:r>
+            <a:r>
+              <a:rPr lang="en-US" baseline="0" dirty="0" smtClean="0"/>
+              <a:t>, SQL Azure, </a:t>
+            </a:r>
+            <a:r>
+              <a:rPr lang="en-US" baseline="0" dirty="0" err="1" smtClean="0"/>
+              <a:t>IoT</a:t>
+            </a:r>
+            <a:r>
+              <a:rPr lang="en-US" baseline="0" dirty="0" smtClean="0"/>
+              <a:t> devices (pushing to event hubs)</a:t>
+            </a:r>
+            <a:endParaRPr lang="en-US" baseline="0" dirty="0" smtClean="0"/>
+          </a:p>
+          <a:p>
+            <a:endParaRPr lang="en-US" baseline="0" dirty="0" smtClean="0"/>
+          </a:p>
+          <a:p>
+            <a:r>
+              <a:rPr lang="en-US" baseline="0" dirty="0" smtClean="0"/>
+              <a:t>Schemas </a:t>
+            </a:r>
+            <a:r>
+              <a:rPr lang="en-US" baseline="0" dirty="0" smtClean="0"/>
+              <a:t>– Every system has their own data structure and format for like </a:t>
+            </a:r>
+            <a:r>
+              <a:rPr lang="en-US" baseline="0" dirty="0" smtClean="0"/>
+              <a:t>data</a:t>
+            </a:r>
+          </a:p>
+          <a:p>
+            <a:endParaRPr lang="en-US" baseline="0" dirty="0" smtClean="0"/>
+          </a:p>
+          <a:p>
+            <a:r>
+              <a:rPr lang="en-US" baseline="0" dirty="0" smtClean="0"/>
+              <a:t>Geo Locations – Different systems in different data centers. </a:t>
+            </a:r>
+            <a:endParaRPr lang="en-US" baseline="0" dirty="0" smtClean="0"/>
+          </a:p>
+          <a:p>
+            <a:endParaRPr lang="en-US" baseline="0" dirty="0" smtClean="0"/>
+          </a:p>
+          <a:p>
+            <a:r>
+              <a:rPr lang="en-US" dirty="0" smtClean="0"/>
+              <a:t>Performance</a:t>
+            </a:r>
+            <a:r>
+              <a:rPr lang="en-US" baseline="0" dirty="0" smtClean="0"/>
+              <a:t> – Above concerns lead to this</a:t>
+            </a:r>
           </a:p>
         </p:txBody>
       </p:sp>
@@ -717,6 +825,262 @@
     <p:extLst>
       <p:ext uri="{BB962C8B-B14F-4D97-AF65-F5344CB8AC3E}">
         <p14:creationId xmlns:p14="http://schemas.microsoft.com/office/powerpoint/2010/main" val="805343648"/>
+      </p:ext>
+    </p:extLst>
+  </p:cSld>
+  <p:clrMapOvr>
+    <a:masterClrMapping/>
+  </p:clrMapOvr>
+</p:notes>
+</file>
+
+<file path=ppt/notesSlides/notesSlide10.xml><?xml version="1.0" encoding="utf-8"?>
+<p:notes xmlns:a="http://schemas.openxmlformats.org/drawingml/2006/main" xmlns:r="http://schemas.openxmlformats.org/officeDocument/2006/relationships" xmlns:p="http://schemas.openxmlformats.org/presentationml/2006/main">
+  <p:cSld>
+    <p:spTree>
+      <p:nvGrpSpPr>
+        <p:cNvPr id="1" name=""/>
+        <p:cNvGrpSpPr/>
+        <p:nvPr/>
+      </p:nvGrpSpPr>
+      <p:grpSpPr>
+        <a:xfrm>
+          <a:off x="0" y="0"/>
+          <a:ext cx="0" cy="0"/>
+          <a:chOff x="0" y="0"/>
+          <a:chExt cx="0" cy="0"/>
+        </a:xfrm>
+      </p:grpSpPr>
+      <p:sp>
+        <p:nvSpPr>
+          <p:cNvPr id="2" name="Slide Image Placeholder 1"/>
+          <p:cNvSpPr>
+            <a:spLocks noGrp="1" noRot="1" noChangeAspect="1"/>
+          </p:cNvSpPr>
+          <p:nvPr>
+            <p:ph type="sldImg"/>
+          </p:nvPr>
+        </p:nvSpPr>
+        <p:spPr/>
+      </p:sp>
+      <p:sp>
+        <p:nvSpPr>
+          <p:cNvPr id="3" name="Notes Placeholder 2"/>
+          <p:cNvSpPr>
+            <a:spLocks noGrp="1"/>
+          </p:cNvSpPr>
+          <p:nvPr>
+            <p:ph type="body" idx="1"/>
+          </p:nvPr>
+        </p:nvSpPr>
+        <p:spPr/>
+        <p:txBody>
+          <a:bodyPr/>
+          <a:lstStyle/>
+          <a:p>
+            <a:r>
+              <a:rPr lang="en-US" dirty="0" smtClean="0"/>
+              <a:t>Scoring</a:t>
+            </a:r>
+            <a:r>
+              <a:rPr lang="en-US" baseline="0" dirty="0" smtClean="0"/>
+              <a:t> = Relevance. Boost relevance based off of rules. “Last Updated within 30 days”</a:t>
+            </a:r>
+            <a:endParaRPr lang="en-US" dirty="0" smtClean="0"/>
+          </a:p>
+        </p:txBody>
+      </p:sp>
+    </p:spTree>
+    <p:extLst>
+      <p:ext uri="{BB962C8B-B14F-4D97-AF65-F5344CB8AC3E}">
+        <p14:creationId xmlns:p14="http://schemas.microsoft.com/office/powerpoint/2010/main" val="2669725493"/>
+      </p:ext>
+    </p:extLst>
+  </p:cSld>
+  <p:clrMapOvr>
+    <a:masterClrMapping/>
+  </p:clrMapOvr>
+</p:notes>
+</file>
+
+<file path=ppt/notesSlides/notesSlide11.xml><?xml version="1.0" encoding="utf-8"?>
+<p:notes xmlns:a="http://schemas.openxmlformats.org/drawingml/2006/main" xmlns:r="http://schemas.openxmlformats.org/officeDocument/2006/relationships" xmlns:p="http://schemas.openxmlformats.org/presentationml/2006/main">
+  <p:cSld>
+    <p:spTree>
+      <p:nvGrpSpPr>
+        <p:cNvPr id="1" name=""/>
+        <p:cNvGrpSpPr/>
+        <p:nvPr/>
+      </p:nvGrpSpPr>
+      <p:grpSpPr>
+        <a:xfrm>
+          <a:off x="0" y="0"/>
+          <a:ext cx="0" cy="0"/>
+          <a:chOff x="0" y="0"/>
+          <a:chExt cx="0" cy="0"/>
+        </a:xfrm>
+      </p:grpSpPr>
+      <p:sp>
+        <p:nvSpPr>
+          <p:cNvPr id="2" name="Slide Image Placeholder 1"/>
+          <p:cNvSpPr>
+            <a:spLocks noGrp="1" noRot="1" noChangeAspect="1"/>
+          </p:cNvSpPr>
+          <p:nvPr>
+            <p:ph type="sldImg"/>
+          </p:nvPr>
+        </p:nvSpPr>
+        <p:spPr/>
+      </p:sp>
+      <p:sp>
+        <p:nvSpPr>
+          <p:cNvPr id="3" name="Notes Placeholder 2"/>
+          <p:cNvSpPr>
+            <a:spLocks noGrp="1"/>
+          </p:cNvSpPr>
+          <p:nvPr>
+            <p:ph type="body" idx="1"/>
+          </p:nvPr>
+        </p:nvSpPr>
+        <p:spPr/>
+        <p:txBody>
+          <a:bodyPr/>
+          <a:lstStyle/>
+          <a:p>
+            <a:r>
+              <a:rPr lang="en-US" dirty="0" smtClean="0"/>
+              <a:t>Cannot scale between free and standard </a:t>
+            </a:r>
+            <a:endParaRPr lang="en-US" dirty="0"/>
+          </a:p>
+        </p:txBody>
+      </p:sp>
+    </p:spTree>
+    <p:extLst>
+      <p:ext uri="{BB962C8B-B14F-4D97-AF65-F5344CB8AC3E}">
+        <p14:creationId xmlns:p14="http://schemas.microsoft.com/office/powerpoint/2010/main" val="596459679"/>
+      </p:ext>
+    </p:extLst>
+  </p:cSld>
+  <p:clrMapOvr>
+    <a:masterClrMapping/>
+  </p:clrMapOvr>
+</p:notes>
+</file>
+
+<file path=ppt/notesSlides/notesSlide12.xml><?xml version="1.0" encoding="utf-8"?>
+<p:notes xmlns:a="http://schemas.openxmlformats.org/drawingml/2006/main" xmlns:r="http://schemas.openxmlformats.org/officeDocument/2006/relationships" xmlns:p="http://schemas.openxmlformats.org/presentationml/2006/main">
+  <p:cSld>
+    <p:spTree>
+      <p:nvGrpSpPr>
+        <p:cNvPr id="1" name=""/>
+        <p:cNvGrpSpPr/>
+        <p:nvPr/>
+      </p:nvGrpSpPr>
+      <p:grpSpPr>
+        <a:xfrm>
+          <a:off x="0" y="0"/>
+          <a:ext cx="0" cy="0"/>
+          <a:chOff x="0" y="0"/>
+          <a:chExt cx="0" cy="0"/>
+        </a:xfrm>
+      </p:grpSpPr>
+      <p:sp>
+        <p:nvSpPr>
+          <p:cNvPr id="2" name="Slide Image Placeholder 1"/>
+          <p:cNvSpPr>
+            <a:spLocks noGrp="1" noRot="1" noChangeAspect="1"/>
+          </p:cNvSpPr>
+          <p:nvPr>
+            <p:ph type="sldImg"/>
+          </p:nvPr>
+        </p:nvSpPr>
+        <p:spPr/>
+      </p:sp>
+      <p:sp>
+        <p:nvSpPr>
+          <p:cNvPr id="3" name="Notes Placeholder 2"/>
+          <p:cNvSpPr>
+            <a:spLocks noGrp="1"/>
+          </p:cNvSpPr>
+          <p:nvPr>
+            <p:ph type="body" idx="1"/>
+          </p:nvPr>
+        </p:nvSpPr>
+        <p:spPr/>
+        <p:txBody>
+          <a:bodyPr/>
+          <a:lstStyle/>
+          <a:p>
+            <a:endParaRPr lang="en-US" dirty="0"/>
+          </a:p>
+        </p:txBody>
+      </p:sp>
+    </p:spTree>
+    <p:extLst>
+      <p:ext uri="{BB962C8B-B14F-4D97-AF65-F5344CB8AC3E}">
+        <p14:creationId xmlns:p14="http://schemas.microsoft.com/office/powerpoint/2010/main" val="4036432611"/>
+      </p:ext>
+    </p:extLst>
+  </p:cSld>
+  <p:clrMapOvr>
+    <a:masterClrMapping/>
+  </p:clrMapOvr>
+</p:notes>
+</file>
+
+<file path=ppt/notesSlides/notesSlide13.xml><?xml version="1.0" encoding="utf-8"?>
+<p:notes xmlns:a="http://schemas.openxmlformats.org/drawingml/2006/main" xmlns:r="http://schemas.openxmlformats.org/officeDocument/2006/relationships" xmlns:p="http://schemas.openxmlformats.org/presentationml/2006/main">
+  <p:cSld>
+    <p:spTree>
+      <p:nvGrpSpPr>
+        <p:cNvPr id="1" name=""/>
+        <p:cNvGrpSpPr/>
+        <p:nvPr/>
+      </p:nvGrpSpPr>
+      <p:grpSpPr>
+        <a:xfrm>
+          <a:off x="0" y="0"/>
+          <a:ext cx="0" cy="0"/>
+          <a:chOff x="0" y="0"/>
+          <a:chExt cx="0" cy="0"/>
+        </a:xfrm>
+      </p:grpSpPr>
+      <p:sp>
+        <p:nvSpPr>
+          <p:cNvPr id="2" name="Slide Image Placeholder 1"/>
+          <p:cNvSpPr>
+            <a:spLocks noGrp="1" noRot="1" noChangeAspect="1"/>
+          </p:cNvSpPr>
+          <p:nvPr>
+            <p:ph type="sldImg"/>
+          </p:nvPr>
+        </p:nvSpPr>
+        <p:spPr/>
+      </p:sp>
+      <p:sp>
+        <p:nvSpPr>
+          <p:cNvPr id="3" name="Notes Placeholder 2"/>
+          <p:cNvSpPr>
+            <a:spLocks noGrp="1"/>
+          </p:cNvSpPr>
+          <p:nvPr>
+            <p:ph type="body" idx="1"/>
+          </p:nvPr>
+        </p:nvSpPr>
+        <p:spPr/>
+        <p:txBody>
+          <a:bodyPr/>
+          <a:lstStyle/>
+          <a:p>
+            <a:endParaRPr lang="en-US" dirty="0"/>
+          </a:p>
+        </p:txBody>
+      </p:sp>
+    </p:spTree>
+    <p:extLst>
+      <p:ext uri="{BB962C8B-B14F-4D97-AF65-F5344CB8AC3E}">
+        <p14:creationId xmlns:p14="http://schemas.microsoft.com/office/powerpoint/2010/main" val="2122150012"/>
       </p:ext>
     </p:extLst>
   </p:cSld>
@@ -770,6 +1134,34 @@
           <a:bodyPr/>
           <a:lstStyle/>
           <a:p>
+            <a:r>
+              <a:rPr lang="en-US" dirty="0" smtClean="0"/>
+              <a:t>Modern DBMS</a:t>
+            </a:r>
+            <a:r>
+              <a:rPr lang="en-US" baseline="0" dirty="0" smtClean="0"/>
+              <a:t> may handle efficiently</a:t>
+            </a:r>
+          </a:p>
+          <a:p>
+            <a:r>
+              <a:rPr lang="en-US" baseline="0" dirty="0" smtClean="0"/>
+              <a:t>Variety of systems require variety of implementation</a:t>
+            </a:r>
+          </a:p>
+          <a:p>
+            <a:r>
+              <a:rPr lang="en-US" baseline="0" dirty="0" smtClean="0"/>
+              <a:t>Not possible without application code for things like Excel</a:t>
+            </a:r>
+          </a:p>
+          <a:p>
+            <a:r>
+              <a:rPr lang="en-US" baseline="0" dirty="0" smtClean="0"/>
+              <a:t>Reports that require calculations may be missing data unless you can get everything from all systems</a:t>
+            </a:r>
+          </a:p>
+          <a:p>
             <a:endParaRPr lang="en-US" dirty="0"/>
           </a:p>
         </p:txBody>
@@ -777,7 +1169,542 @@
     </p:spTree>
     <p:extLst>
       <p:ext uri="{BB962C8B-B14F-4D97-AF65-F5344CB8AC3E}">
-        <p14:creationId xmlns:p14="http://schemas.microsoft.com/office/powerpoint/2010/main" val="4036432611"/>
+        <p14:creationId xmlns:p14="http://schemas.microsoft.com/office/powerpoint/2010/main" val="1302988070"/>
+      </p:ext>
+    </p:extLst>
+  </p:cSld>
+  <p:clrMapOvr>
+    <a:masterClrMapping/>
+  </p:clrMapOvr>
+</p:notes>
+</file>
+
+<file path=ppt/notesSlides/notesSlide3.xml><?xml version="1.0" encoding="utf-8"?>
+<p:notes xmlns:a="http://schemas.openxmlformats.org/drawingml/2006/main" xmlns:r="http://schemas.openxmlformats.org/officeDocument/2006/relationships" xmlns:p="http://schemas.openxmlformats.org/presentationml/2006/main">
+  <p:cSld>
+    <p:spTree>
+      <p:nvGrpSpPr>
+        <p:cNvPr id="1" name=""/>
+        <p:cNvGrpSpPr/>
+        <p:nvPr/>
+      </p:nvGrpSpPr>
+      <p:grpSpPr>
+        <a:xfrm>
+          <a:off x="0" y="0"/>
+          <a:ext cx="0" cy="0"/>
+          <a:chOff x="0" y="0"/>
+          <a:chExt cx="0" cy="0"/>
+        </a:xfrm>
+      </p:grpSpPr>
+      <p:sp>
+        <p:nvSpPr>
+          <p:cNvPr id="2" name="Slide Image Placeholder 1"/>
+          <p:cNvSpPr>
+            <a:spLocks noGrp="1" noRot="1" noChangeAspect="1"/>
+          </p:cNvSpPr>
+          <p:nvPr>
+            <p:ph type="sldImg"/>
+          </p:nvPr>
+        </p:nvSpPr>
+        <p:spPr/>
+      </p:sp>
+      <p:sp>
+        <p:nvSpPr>
+          <p:cNvPr id="3" name="Notes Placeholder 2"/>
+          <p:cNvSpPr>
+            <a:spLocks noGrp="1"/>
+          </p:cNvSpPr>
+          <p:nvPr>
+            <p:ph type="body" idx="1"/>
+          </p:nvPr>
+        </p:nvSpPr>
+        <p:spPr/>
+        <p:txBody>
+          <a:bodyPr/>
+          <a:lstStyle/>
+          <a:p>
+            <a:r>
+              <a:rPr lang="en-US" dirty="0" smtClean="0"/>
+              <a:t>Prefix matches the</a:t>
+            </a:r>
+            <a:r>
+              <a:rPr lang="en-US" baseline="0" dirty="0" smtClean="0"/>
+              <a:t> beginning of a string, Infix matches expression inside of a string</a:t>
+            </a:r>
+            <a:endParaRPr lang="en-US" dirty="0" smtClean="0"/>
+          </a:p>
+          <a:p>
+            <a:r>
+              <a:rPr lang="en-US" dirty="0" smtClean="0"/>
+              <a:t>Fuzzy matching will suggest results in case you have a misspelling, but can reduce performance</a:t>
+            </a:r>
+            <a:endParaRPr lang="en-US" dirty="0"/>
+          </a:p>
+        </p:txBody>
+      </p:sp>
+    </p:spTree>
+    <p:extLst>
+      <p:ext uri="{BB962C8B-B14F-4D97-AF65-F5344CB8AC3E}">
+        <p14:creationId xmlns:p14="http://schemas.microsoft.com/office/powerpoint/2010/main" val="2307281831"/>
+      </p:ext>
+    </p:extLst>
+  </p:cSld>
+  <p:clrMapOvr>
+    <a:masterClrMapping/>
+  </p:clrMapOvr>
+</p:notes>
+</file>
+
+<file path=ppt/notesSlides/notesSlide4.xml><?xml version="1.0" encoding="utf-8"?>
+<p:notes xmlns:a="http://schemas.openxmlformats.org/drawingml/2006/main" xmlns:r="http://schemas.openxmlformats.org/officeDocument/2006/relationships" xmlns:p="http://schemas.openxmlformats.org/presentationml/2006/main">
+  <p:cSld>
+    <p:spTree>
+      <p:nvGrpSpPr>
+        <p:cNvPr id="1" name=""/>
+        <p:cNvGrpSpPr/>
+        <p:nvPr/>
+      </p:nvGrpSpPr>
+      <p:grpSpPr>
+        <a:xfrm>
+          <a:off x="0" y="0"/>
+          <a:ext cx="0" cy="0"/>
+          <a:chOff x="0" y="0"/>
+          <a:chExt cx="0" cy="0"/>
+        </a:xfrm>
+      </p:grpSpPr>
+      <p:sp>
+        <p:nvSpPr>
+          <p:cNvPr id="2" name="Slide Image Placeholder 1"/>
+          <p:cNvSpPr>
+            <a:spLocks noGrp="1" noRot="1" noChangeAspect="1"/>
+          </p:cNvSpPr>
+          <p:nvPr>
+            <p:ph type="sldImg"/>
+          </p:nvPr>
+        </p:nvSpPr>
+        <p:spPr/>
+      </p:sp>
+      <p:sp>
+        <p:nvSpPr>
+          <p:cNvPr id="3" name="Notes Placeholder 2"/>
+          <p:cNvSpPr>
+            <a:spLocks noGrp="1"/>
+          </p:cNvSpPr>
+          <p:nvPr>
+            <p:ph type="body" idx="1"/>
+          </p:nvPr>
+        </p:nvSpPr>
+        <p:spPr/>
+        <p:txBody>
+          <a:bodyPr/>
+          <a:lstStyle/>
+          <a:p>
+            <a:r>
+              <a:rPr lang="en-US" dirty="0" smtClean="0"/>
+              <a:t>Geospatial Point/Polygon</a:t>
+            </a:r>
+            <a:r>
+              <a:rPr lang="en-US" baseline="0" dirty="0" smtClean="0"/>
+              <a:t> where a document is within a range</a:t>
+            </a:r>
+          </a:p>
+          <a:p>
+            <a:endParaRPr lang="en-US" baseline="0" dirty="0" smtClean="0"/>
+          </a:p>
+          <a:p>
+            <a:r>
+              <a:rPr lang="en-US" baseline="0" dirty="0" smtClean="0"/>
+              <a:t>Geo functions are in kilometers</a:t>
+            </a:r>
+            <a:endParaRPr lang="en-US" dirty="0"/>
+          </a:p>
+        </p:txBody>
+      </p:sp>
+    </p:spTree>
+    <p:extLst>
+      <p:ext uri="{BB962C8B-B14F-4D97-AF65-F5344CB8AC3E}">
+        <p14:creationId xmlns:p14="http://schemas.microsoft.com/office/powerpoint/2010/main" val="4289512442"/>
+      </p:ext>
+    </p:extLst>
+  </p:cSld>
+  <p:clrMapOvr>
+    <a:masterClrMapping/>
+  </p:clrMapOvr>
+</p:notes>
+</file>
+
+<file path=ppt/notesSlides/notesSlide5.xml><?xml version="1.0" encoding="utf-8"?>
+<p:notes xmlns:a="http://schemas.openxmlformats.org/drawingml/2006/main" xmlns:r="http://schemas.openxmlformats.org/officeDocument/2006/relationships" xmlns:p="http://schemas.openxmlformats.org/presentationml/2006/main">
+  <p:cSld>
+    <p:spTree>
+      <p:nvGrpSpPr>
+        <p:cNvPr id="1" name=""/>
+        <p:cNvGrpSpPr/>
+        <p:nvPr/>
+      </p:nvGrpSpPr>
+      <p:grpSpPr>
+        <a:xfrm>
+          <a:off x="0" y="0"/>
+          <a:ext cx="0" cy="0"/>
+          <a:chOff x="0" y="0"/>
+          <a:chExt cx="0" cy="0"/>
+        </a:xfrm>
+      </p:grpSpPr>
+      <p:sp>
+        <p:nvSpPr>
+          <p:cNvPr id="2" name="Slide Image Placeholder 1"/>
+          <p:cNvSpPr>
+            <a:spLocks noGrp="1" noRot="1" noChangeAspect="1"/>
+          </p:cNvSpPr>
+          <p:nvPr>
+            <p:ph type="sldImg"/>
+          </p:nvPr>
+        </p:nvSpPr>
+        <p:spPr/>
+      </p:sp>
+      <p:sp>
+        <p:nvSpPr>
+          <p:cNvPr id="3" name="Notes Placeholder 2"/>
+          <p:cNvSpPr>
+            <a:spLocks noGrp="1"/>
+          </p:cNvSpPr>
+          <p:nvPr>
+            <p:ph type="body" idx="1"/>
+          </p:nvPr>
+        </p:nvSpPr>
+        <p:spPr/>
+        <p:txBody>
+          <a:bodyPr/>
+          <a:lstStyle/>
+          <a:p>
+            <a:r>
+              <a:rPr lang="en-US" dirty="0" smtClean="0"/>
+              <a:t>Supply</a:t>
+            </a:r>
+            <a:r>
+              <a:rPr lang="en-US" baseline="0" dirty="0" smtClean="0"/>
+              <a:t> pre &amp; post fix strings to be applied to each word in the result that matches the search.</a:t>
+            </a:r>
+            <a:endParaRPr lang="en-US" dirty="0"/>
+          </a:p>
+        </p:txBody>
+      </p:sp>
+    </p:spTree>
+    <p:extLst>
+      <p:ext uri="{BB962C8B-B14F-4D97-AF65-F5344CB8AC3E}">
+        <p14:creationId xmlns:p14="http://schemas.microsoft.com/office/powerpoint/2010/main" val="2029516589"/>
+      </p:ext>
+    </p:extLst>
+  </p:cSld>
+  <p:clrMapOvr>
+    <a:masterClrMapping/>
+  </p:clrMapOvr>
+</p:notes>
+</file>
+
+<file path=ppt/notesSlides/notesSlide6.xml><?xml version="1.0" encoding="utf-8"?>
+<p:notes xmlns:a="http://schemas.openxmlformats.org/drawingml/2006/main" xmlns:r="http://schemas.openxmlformats.org/officeDocument/2006/relationships" xmlns:p="http://schemas.openxmlformats.org/presentationml/2006/main">
+  <p:cSld>
+    <p:spTree>
+      <p:nvGrpSpPr>
+        <p:cNvPr id="1" name=""/>
+        <p:cNvGrpSpPr/>
+        <p:nvPr/>
+      </p:nvGrpSpPr>
+      <p:grpSpPr>
+        <a:xfrm>
+          <a:off x="0" y="0"/>
+          <a:ext cx="0" cy="0"/>
+          <a:chOff x="0" y="0"/>
+          <a:chExt cx="0" cy="0"/>
+        </a:xfrm>
+      </p:grpSpPr>
+      <p:sp>
+        <p:nvSpPr>
+          <p:cNvPr id="2" name="Slide Image Placeholder 1"/>
+          <p:cNvSpPr>
+            <a:spLocks noGrp="1" noRot="1" noChangeAspect="1"/>
+          </p:cNvSpPr>
+          <p:nvPr>
+            <p:ph type="sldImg"/>
+          </p:nvPr>
+        </p:nvSpPr>
+        <p:spPr/>
+      </p:sp>
+      <p:sp>
+        <p:nvSpPr>
+          <p:cNvPr id="3" name="Notes Placeholder 2"/>
+          <p:cNvSpPr>
+            <a:spLocks noGrp="1"/>
+          </p:cNvSpPr>
+          <p:nvPr>
+            <p:ph type="body" idx="1"/>
+          </p:nvPr>
+        </p:nvSpPr>
+        <p:spPr/>
+        <p:txBody>
+          <a:bodyPr/>
+          <a:lstStyle/>
+          <a:p>
+            <a:r>
+              <a:rPr lang="en-US" dirty="0" smtClean="0"/>
+              <a:t>Web job to</a:t>
+            </a:r>
+            <a:r>
+              <a:rPr lang="en-US" baseline="0" dirty="0" smtClean="0"/>
+              <a:t> get #</a:t>
+            </a:r>
+            <a:r>
+              <a:rPr lang="en-US" baseline="0" dirty="0" err="1" smtClean="0"/>
+              <a:t>MarchMadness</a:t>
+            </a:r>
+            <a:r>
+              <a:rPr lang="en-US" baseline="0" dirty="0" smtClean="0"/>
+              <a:t> tweets</a:t>
+            </a:r>
+          </a:p>
+          <a:p>
+            <a:r>
+              <a:rPr lang="en-US" dirty="0" smtClean="0"/>
+              <a:t>Web</a:t>
+            </a:r>
+            <a:r>
+              <a:rPr lang="en-US" baseline="0" dirty="0" smtClean="0"/>
+              <a:t> job to process tweets into search</a:t>
+            </a:r>
+          </a:p>
+          <a:p>
+            <a:r>
+              <a:rPr lang="en-US" baseline="0" dirty="0" smtClean="0"/>
+              <a:t>Windows 10 app to consume search</a:t>
+            </a:r>
+            <a:endParaRPr lang="en-US" dirty="0"/>
+          </a:p>
+        </p:txBody>
+      </p:sp>
+    </p:spTree>
+    <p:extLst>
+      <p:ext uri="{BB962C8B-B14F-4D97-AF65-F5344CB8AC3E}">
+        <p14:creationId xmlns:p14="http://schemas.microsoft.com/office/powerpoint/2010/main" val="4066480179"/>
+      </p:ext>
+    </p:extLst>
+  </p:cSld>
+  <p:clrMapOvr>
+    <a:masterClrMapping/>
+  </p:clrMapOvr>
+</p:notes>
+</file>
+
+<file path=ppt/notesSlides/notesSlide7.xml><?xml version="1.0" encoding="utf-8"?>
+<p:notes xmlns:a="http://schemas.openxmlformats.org/drawingml/2006/main" xmlns:r="http://schemas.openxmlformats.org/officeDocument/2006/relationships" xmlns:p="http://schemas.openxmlformats.org/presentationml/2006/main">
+  <p:cSld>
+    <p:spTree>
+      <p:nvGrpSpPr>
+        <p:cNvPr id="1" name=""/>
+        <p:cNvGrpSpPr/>
+        <p:nvPr/>
+      </p:nvGrpSpPr>
+      <p:grpSpPr>
+        <a:xfrm>
+          <a:off x="0" y="0"/>
+          <a:ext cx="0" cy="0"/>
+          <a:chOff x="0" y="0"/>
+          <a:chExt cx="0" cy="0"/>
+        </a:xfrm>
+      </p:grpSpPr>
+      <p:sp>
+        <p:nvSpPr>
+          <p:cNvPr id="2" name="Slide Image Placeholder 1"/>
+          <p:cNvSpPr>
+            <a:spLocks noGrp="1" noRot="1" noChangeAspect="1"/>
+          </p:cNvSpPr>
+          <p:nvPr>
+            <p:ph type="sldImg"/>
+          </p:nvPr>
+        </p:nvSpPr>
+        <p:spPr/>
+      </p:sp>
+      <p:sp>
+        <p:nvSpPr>
+          <p:cNvPr id="3" name="Notes Placeholder 2"/>
+          <p:cNvSpPr>
+            <a:spLocks noGrp="1"/>
+          </p:cNvSpPr>
+          <p:nvPr>
+            <p:ph type="body" idx="1"/>
+          </p:nvPr>
+        </p:nvSpPr>
+        <p:spPr/>
+        <p:txBody>
+          <a:bodyPr/>
+          <a:lstStyle/>
+          <a:p>
+            <a:r>
+              <a:rPr lang="en-US" dirty="0" smtClean="0"/>
+              <a:t>How to create</a:t>
+            </a:r>
+          </a:p>
+          <a:p>
+            <a:r>
+              <a:rPr lang="en-US" dirty="0" smtClean="0"/>
+              <a:t>Show existing dashboard, index, schema, and </a:t>
+            </a:r>
+            <a:r>
+              <a:rPr lang="en-US" dirty="0" err="1" smtClean="0"/>
+              <a:t>suggesters</a:t>
+            </a:r>
+            <a:r>
+              <a:rPr lang="en-US" dirty="0" smtClean="0"/>
+              <a:t>.</a:t>
+            </a:r>
+          </a:p>
+          <a:p>
+            <a:r>
+              <a:rPr lang="en-US" dirty="0" smtClean="0"/>
+              <a:t>Create</a:t>
+            </a:r>
+            <a:r>
+              <a:rPr lang="en-US" baseline="0" dirty="0" smtClean="0"/>
+              <a:t> Search index console app.</a:t>
+            </a:r>
+            <a:endParaRPr lang="en-US" dirty="0"/>
+          </a:p>
+        </p:txBody>
+      </p:sp>
+    </p:spTree>
+    <p:extLst>
+      <p:ext uri="{BB962C8B-B14F-4D97-AF65-F5344CB8AC3E}">
+        <p14:creationId xmlns:p14="http://schemas.microsoft.com/office/powerpoint/2010/main" val="2210613920"/>
+      </p:ext>
+    </p:extLst>
+  </p:cSld>
+  <p:clrMapOvr>
+    <a:masterClrMapping/>
+  </p:clrMapOvr>
+</p:notes>
+</file>
+
+<file path=ppt/notesSlides/notesSlide8.xml><?xml version="1.0" encoding="utf-8"?>
+<p:notes xmlns:a="http://schemas.openxmlformats.org/drawingml/2006/main" xmlns:r="http://schemas.openxmlformats.org/officeDocument/2006/relationships" xmlns:p="http://schemas.openxmlformats.org/presentationml/2006/main">
+  <p:cSld>
+    <p:spTree>
+      <p:nvGrpSpPr>
+        <p:cNvPr id="1" name=""/>
+        <p:cNvGrpSpPr/>
+        <p:nvPr/>
+      </p:nvGrpSpPr>
+      <p:grpSpPr>
+        <a:xfrm>
+          <a:off x="0" y="0"/>
+          <a:ext cx="0" cy="0"/>
+          <a:chOff x="0" y="0"/>
+          <a:chExt cx="0" cy="0"/>
+        </a:xfrm>
+      </p:grpSpPr>
+      <p:sp>
+        <p:nvSpPr>
+          <p:cNvPr id="2" name="Slide Image Placeholder 1"/>
+          <p:cNvSpPr>
+            <a:spLocks noGrp="1" noRot="1" noChangeAspect="1"/>
+          </p:cNvSpPr>
+          <p:nvPr>
+            <p:ph type="sldImg"/>
+          </p:nvPr>
+        </p:nvSpPr>
+        <p:spPr/>
+      </p:sp>
+      <p:sp>
+        <p:nvSpPr>
+          <p:cNvPr id="3" name="Notes Placeholder 2"/>
+          <p:cNvSpPr>
+            <a:spLocks noGrp="1"/>
+          </p:cNvSpPr>
+          <p:nvPr>
+            <p:ph type="body" idx="1"/>
+          </p:nvPr>
+        </p:nvSpPr>
+        <p:spPr/>
+        <p:txBody>
+          <a:bodyPr/>
+          <a:lstStyle/>
+          <a:p>
+            <a:endParaRPr lang="en-US" dirty="0"/>
+          </a:p>
+        </p:txBody>
+      </p:sp>
+    </p:spTree>
+    <p:extLst>
+      <p:ext uri="{BB962C8B-B14F-4D97-AF65-F5344CB8AC3E}">
+        <p14:creationId xmlns:p14="http://schemas.microsoft.com/office/powerpoint/2010/main" val="2693798663"/>
+      </p:ext>
+    </p:extLst>
+  </p:cSld>
+  <p:clrMapOvr>
+    <a:masterClrMapping/>
+  </p:clrMapOvr>
+</p:notes>
+</file>
+
+<file path=ppt/notesSlides/notesSlide9.xml><?xml version="1.0" encoding="utf-8"?>
+<p:notes xmlns:a="http://schemas.openxmlformats.org/drawingml/2006/main" xmlns:r="http://schemas.openxmlformats.org/officeDocument/2006/relationships" xmlns:p="http://schemas.openxmlformats.org/presentationml/2006/main">
+  <p:cSld>
+    <p:spTree>
+      <p:nvGrpSpPr>
+        <p:cNvPr id="1" name=""/>
+        <p:cNvGrpSpPr/>
+        <p:nvPr/>
+      </p:nvGrpSpPr>
+      <p:grpSpPr>
+        <a:xfrm>
+          <a:off x="0" y="0"/>
+          <a:ext cx="0" cy="0"/>
+          <a:chOff x="0" y="0"/>
+          <a:chExt cx="0" cy="0"/>
+        </a:xfrm>
+      </p:grpSpPr>
+      <p:sp>
+        <p:nvSpPr>
+          <p:cNvPr id="2" name="Slide Image Placeholder 1"/>
+          <p:cNvSpPr>
+            <a:spLocks noGrp="1" noRot="1" noChangeAspect="1"/>
+          </p:cNvSpPr>
+          <p:nvPr>
+            <p:ph type="sldImg"/>
+          </p:nvPr>
+        </p:nvSpPr>
+        <p:spPr/>
+      </p:sp>
+      <p:sp>
+        <p:nvSpPr>
+          <p:cNvPr id="3" name="Notes Placeholder 2"/>
+          <p:cNvSpPr>
+            <a:spLocks noGrp="1"/>
+          </p:cNvSpPr>
+          <p:nvPr>
+            <p:ph type="body" idx="1"/>
+          </p:nvPr>
+        </p:nvSpPr>
+        <p:spPr/>
+        <p:txBody>
+          <a:bodyPr/>
+          <a:lstStyle/>
+          <a:p>
+            <a:r>
+              <a:rPr lang="en-US" dirty="0" smtClean="0"/>
+              <a:t>In the current release, any re-indexing operations</a:t>
+            </a:r>
+            <a:r>
+              <a:rPr lang="en-US" baseline="0" dirty="0" smtClean="0"/>
+              <a:t> require a complete rebuild of the index, which in turn deletes the data.</a:t>
+            </a:r>
+            <a:endParaRPr lang="en-US" dirty="0"/>
+          </a:p>
+        </p:txBody>
+      </p:sp>
+    </p:spTree>
+    <p:extLst>
+      <p:ext uri="{BB962C8B-B14F-4D97-AF65-F5344CB8AC3E}">
+        <p14:creationId xmlns:p14="http://schemas.microsoft.com/office/powerpoint/2010/main" val="1669137272"/>
       </p:ext>
     </p:extLst>
   </p:cSld>
@@ -3158,21 +4085,8 @@
                   <a:lin ang="5400000" scaled="0"/>
                 </a:gradFill>
               </a:rPr>
-              <a:t> of 19</a:t>
-            </a:r>
-            <a:endParaRPr lang="en-US" sz="1200" dirty="0" smtClean="0">
-              <a:gradFill>
-                <a:gsLst>
-                  <a:gs pos="2917">
-                    <a:schemeClr val="tx1"/>
-                  </a:gs>
-                  <a:gs pos="30000">
-                    <a:schemeClr val="tx1"/>
-                  </a:gs>
-                </a:gsLst>
-                <a:lin ang="5400000" scaled="0"/>
-              </a:gradFill>
-            </a:endParaRPr>
+              <a:t> of 20</a:t>
+            </a:r>
           </a:p>
         </p:txBody>
       </p:sp>
@@ -14461,7 +15375,7 @@
           <p:nvPr/>
         </p:nvPicPr>
         <p:blipFill>
-          <a:blip r:embed="rId2" cstate="print">
+          <a:blip r:embed="rId3" cstate="print">
             <a:extLst>
               <a:ext uri="{28A0092B-C50C-407E-A947-70E740481C1C}">
                 <a14:useLocalDpi xmlns:a14="http://schemas.microsoft.com/office/drawing/2010/main" val="0"/>
@@ -14502,7 +15416,7 @@
           <p:nvPr/>
         </p:nvPicPr>
         <p:blipFill>
-          <a:blip r:embed="rId3" cstate="print">
+          <a:blip r:embed="rId4" cstate="print">
             <a:extLst>
               <a:ext uri="{28A0092B-C50C-407E-A947-70E740481C1C}">
                 <a14:useLocalDpi xmlns:a14="http://schemas.microsoft.com/office/drawing/2010/main" val="0"/>
@@ -14532,7 +15446,7 @@
           <p:nvPr/>
         </p:nvPicPr>
         <p:blipFill>
-          <a:blip r:embed="rId4" cstate="print">
+          <a:blip r:embed="rId5" cstate="print">
             <a:duotone>
               <a:schemeClr val="accent3">
                 <a:shade val="45000"/>
@@ -14569,7 +15483,7 @@
           <p:nvPr/>
         </p:nvPicPr>
         <p:blipFill>
-          <a:blip r:embed="rId5" cstate="print">
+          <a:blip r:embed="rId6" cstate="print">
             <a:extLst>
               <a:ext uri="{28A0092B-C50C-407E-A947-70E740481C1C}">
                 <a14:useLocalDpi xmlns:a14="http://schemas.microsoft.com/office/drawing/2010/main" val="0"/>
@@ -14593,6 +15507,36 @@
       <p:pic>
         <p:nvPicPr>
           <p:cNvPr id="7" name="Picture 6"/>
+          <p:cNvPicPr>
+            <a:picLocks noChangeAspect="1"/>
+          </p:cNvPicPr>
+          <p:nvPr/>
+        </p:nvPicPr>
+        <p:blipFill>
+          <a:blip r:embed="rId7" cstate="print">
+            <a:extLst>
+              <a:ext uri="{28A0092B-C50C-407E-A947-70E740481C1C}">
+                <a14:useLocalDpi xmlns:a14="http://schemas.microsoft.com/office/drawing/2010/main" val="0"/>
+              </a:ext>
+            </a:extLst>
+          </a:blip>
+          <a:stretch>
+            <a:fillRect/>
+          </a:stretch>
+        </p:blipFill>
+        <p:spPr>
+          <a:xfrm>
+            <a:off x="5201351" y="4223707"/>
+            <a:ext cx="1433499" cy="1433499"/>
+          </a:xfrm>
+          <a:prstGeom prst="rect">
+            <a:avLst/>
+          </a:prstGeom>
+        </p:spPr>
+      </p:pic>
+      <p:pic>
+        <p:nvPicPr>
+          <p:cNvPr id="9" name="Picture 8"/>
           <p:cNvPicPr>
             <a:picLocks noChangeAspect="1"/>
           </p:cNvPicPr>
@@ -14612,36 +15556,6 @@
         </p:blipFill>
         <p:spPr>
           <a:xfrm>
-            <a:off x="5201351" y="4223707"/>
-            <a:ext cx="1433499" cy="1433499"/>
-          </a:xfrm>
-          <a:prstGeom prst="rect">
-            <a:avLst/>
-          </a:prstGeom>
-        </p:spPr>
-      </p:pic>
-      <p:pic>
-        <p:nvPicPr>
-          <p:cNvPr id="9" name="Picture 8"/>
-          <p:cNvPicPr>
-            <a:picLocks noChangeAspect="1"/>
-          </p:cNvPicPr>
-          <p:nvPr/>
-        </p:nvPicPr>
-        <p:blipFill>
-          <a:blip r:embed="rId5" cstate="print">
-            <a:extLst>
-              <a:ext uri="{28A0092B-C50C-407E-A947-70E740481C1C}">
-                <a14:useLocalDpi xmlns:a14="http://schemas.microsoft.com/office/drawing/2010/main" val="0"/>
-              </a:ext>
-            </a:extLst>
-          </a:blip>
-          <a:stretch>
-            <a:fillRect/>
-          </a:stretch>
-        </p:blipFill>
-        <p:spPr>
-          <a:xfrm>
             <a:off x="4689755" y="2388223"/>
             <a:ext cx="1023191" cy="1023191"/>
           </a:xfrm>
@@ -14659,7 +15573,7 @@
           <p:nvPr/>
         </p:nvPicPr>
         <p:blipFill>
-          <a:blip r:embed="rId7" cstate="print">
+          <a:blip r:embed="rId8" cstate="print">
             <a:extLst>
               <a:ext uri="{28A0092B-C50C-407E-A947-70E740481C1C}">
                 <a14:useLocalDpi xmlns:a14="http://schemas.microsoft.com/office/drawing/2010/main" val="0"/>
@@ -14935,19 +15849,6 @@
               </a:rPr>
               <a:t>Get Tweets Web Job</a:t>
             </a:r>
-            <a:endParaRPr lang="en-US" dirty="0" smtClean="0">
-              <a:gradFill>
-                <a:gsLst>
-                  <a:gs pos="2917">
-                    <a:schemeClr val="tx1"/>
-                  </a:gs>
-                  <a:gs pos="30000">
-                    <a:schemeClr val="tx1"/>
-                  </a:gs>
-                </a:gsLst>
-                <a:lin ang="5400000" scaled="0"/>
-              </a:gradFill>
-            </a:endParaRPr>
           </a:p>
         </p:txBody>
       </p:sp>
@@ -14997,19 +15898,6 @@
               </a:rPr>
               <a:t>Storage Queue</a:t>
             </a:r>
-            <a:endParaRPr lang="en-US" dirty="0" smtClean="0">
-              <a:gradFill>
-                <a:gsLst>
-                  <a:gs pos="2917">
-                    <a:schemeClr val="tx1"/>
-                  </a:gs>
-                  <a:gs pos="30000">
-                    <a:schemeClr val="tx1"/>
-                  </a:gs>
-                </a:gsLst>
-                <a:lin ang="5400000" scaled="0"/>
-              </a:gradFill>
-            </a:endParaRPr>
           </a:p>
         </p:txBody>
       </p:sp>
@@ -15059,19 +15947,6 @@
               </a:rPr>
               <a:t>Process Tweets Web Job</a:t>
             </a:r>
-            <a:endParaRPr lang="en-US" dirty="0" smtClean="0">
-              <a:gradFill>
-                <a:gsLst>
-                  <a:gs pos="2917">
-                    <a:schemeClr val="tx1"/>
-                  </a:gs>
-                  <a:gs pos="30000">
-                    <a:schemeClr val="tx1"/>
-                  </a:gs>
-                </a:gsLst>
-                <a:lin ang="5400000" scaled="0"/>
-              </a:gradFill>
-            </a:endParaRPr>
           </a:p>
         </p:txBody>
       </p:sp>
@@ -15121,19 +15996,6 @@
               </a:rPr>
               <a:t>Client Applications</a:t>
             </a:r>
-            <a:endParaRPr lang="en-US" dirty="0" smtClean="0">
-              <a:gradFill>
-                <a:gsLst>
-                  <a:gs pos="2917">
-                    <a:schemeClr val="tx1"/>
-                  </a:gs>
-                  <a:gs pos="30000">
-                    <a:schemeClr val="tx1"/>
-                  </a:gs>
-                </a:gsLst>
-                <a:lin ang="5400000" scaled="0"/>
-              </a:gradFill>
-            </a:endParaRPr>
           </a:p>
         </p:txBody>
       </p:sp>
@@ -15183,19 +16045,6 @@
               </a:rPr>
               <a:t>Search Service</a:t>
             </a:r>
-            <a:endParaRPr lang="en-US" dirty="0" smtClean="0">
-              <a:gradFill>
-                <a:gsLst>
-                  <a:gs pos="2917">
-                    <a:schemeClr val="tx1"/>
-                  </a:gs>
-                  <a:gs pos="30000">
-                    <a:schemeClr val="tx1"/>
-                  </a:gs>
-                </a:gsLst>
-                <a:lin ang="5400000" scaled="0"/>
-              </a:gradFill>
-            </a:endParaRPr>
           </a:p>
         </p:txBody>
       </p:sp>
@@ -15537,10 +16386,9 @@
               <a:buChar char="•"/>
             </a:pPr>
             <a:r>
-              <a:rPr lang="en-US" dirty="0" err="1" smtClean="0"/>
+              <a:rPr lang="en-US" dirty="0" smtClean="0"/>
               <a:t>ViewModel</a:t>
             </a:r>
-            <a:endParaRPr lang="en-US" dirty="0" smtClean="0"/>
           </a:p>
           <a:p>
             <a:pPr marL="571500" indent="-571500">
@@ -15631,7 +16479,7 @@
         <p:spPr>
           <a:xfrm>
             <a:off x="269239" y="1189177"/>
-            <a:ext cx="11653523" cy="2718821"/>
+            <a:ext cx="11653523" cy="3382529"/>
           </a:xfrm>
         </p:spPr>
         <p:txBody>
@@ -15683,6 +16531,16 @@
             <a:r>
               <a:rPr lang="en-US" dirty="0" smtClean="0"/>
               <a:t>Search requests limited to 1 index</a:t>
+            </a:r>
+          </a:p>
+          <a:p>
+            <a:pPr marL="571500" indent="-571500">
+              <a:buFont typeface="Arial" panose="020B0604020202020204" pitchFamily="34" charset="0"/>
+              <a:buChar char="•"/>
+            </a:pPr>
+            <a:r>
+              <a:rPr lang="en-US" dirty="0" smtClean="0"/>
+              <a:t>Indexes non-modifiable once declared</a:t>
             </a:r>
             <a:endParaRPr lang="en-US" dirty="0"/>
           </a:p>
@@ -15764,7 +16622,7 @@
         <p:spPr>
           <a:xfrm>
             <a:off x="269239" y="1189177"/>
-            <a:ext cx="11653523" cy="5373651"/>
+            <a:ext cx="11653523" cy="4709944"/>
           </a:xfrm>
         </p:spPr>
         <p:txBody>
@@ -15781,7 +16639,7 @@
             </a:r>
             <a:r>
               <a:rPr lang="en-US" sz="2400" dirty="0">
-                <a:hlinkClick r:id="rId2"/>
+                <a:hlinkClick r:id="rId3"/>
               </a:rPr>
               <a:t>https://photosynth.net/preview/map</a:t>
             </a:r>
@@ -15794,17 +16652,7 @@
             </a:pPr>
             <a:r>
               <a:rPr lang="en-US" dirty="0" smtClean="0"/>
-              <a:t>Tag Boosting</a:t>
-            </a:r>
-          </a:p>
-          <a:p>
-            <a:pPr marL="571500" indent="-571500">
-              <a:buFont typeface="Arial" panose="020B0604020202020204" pitchFamily="34" charset="0"/>
-              <a:buChar char="•"/>
-            </a:pPr>
-            <a:r>
-              <a:rPr lang="en-US" dirty="0" smtClean="0"/>
-              <a:t>Scoring System</a:t>
+              <a:t>Scoring </a:t>
             </a:r>
           </a:p>
           <a:p>
@@ -15953,7 +16801,7 @@
           <p:nvPr/>
         </p:nvPicPr>
         <p:blipFill>
-          <a:blip r:embed="rId2">
+          <a:blip r:embed="rId3">
             <a:extLst>
               <a:ext uri="{28A0092B-C50C-407E-A947-70E740481C1C}">
                 <a14:useLocalDpi xmlns:a14="http://schemas.microsoft.com/office/drawing/2010/main" val="0"/>
@@ -15994,7 +16842,7 @@
           <p:nvPr/>
         </p:nvPicPr>
         <p:blipFill>
-          <a:blip r:embed="rId3">
+          <a:blip r:embed="rId4">
             <a:extLst>
               <a:ext uri="{28A0092B-C50C-407E-A947-70E740481C1C}">
                 <a14:useLocalDpi xmlns:a14="http://schemas.microsoft.com/office/drawing/2010/main" val="0"/>
@@ -16083,11 +16931,8 @@
           <a:p>
             <a:r>
               <a:rPr lang="en-US" dirty="0" smtClean="0"/>
-              <a:t>Resources</a:t>
-            </a:r>
-            <a:br>
-              <a:rPr lang="en-US" dirty="0" smtClean="0"/>
-            </a:br>
+              <a:t>Questions</a:t>
+            </a:r>
             <a:endParaRPr lang="en-US" dirty="0"/>
           </a:p>
         </p:txBody>
@@ -16104,8 +16949,8 @@
         </p:nvSpPr>
         <p:spPr>
           <a:xfrm>
-            <a:off x="269239" y="1189177"/>
-            <a:ext cx="11653523" cy="5370701"/>
+            <a:off x="465884" y="1543138"/>
+            <a:ext cx="10713393" cy="2794611"/>
           </a:xfrm>
         </p:spPr>
         <p:txBody>
@@ -16113,321 +16958,158 @@
           <a:lstStyle/>
           <a:p>
             <a:r>
-              <a:rPr lang="en-US" sz="2000" dirty="0" smtClean="0"/>
-              <a:t>OData Expressions - </a:t>
-            </a:r>
-            <a:r>
-              <a:rPr lang="en-US" sz="1400" dirty="0" smtClean="0">
-                <a:hlinkClick r:id="rId2"/>
+              <a:rPr lang="en-US" sz="3200" dirty="0" smtClean="0"/>
+              <a:t>Tim Gabrhel</a:t>
+            </a:r>
+          </a:p>
+          <a:p>
+            <a:r>
+              <a:rPr lang="en-US" sz="3200" dirty="0">
+                <a:solidFill>
+                  <a:schemeClr val="tx1"/>
+                </a:solidFill>
               </a:rPr>
-              <a:t>https://msdn.microsoft.com/en-us/library/azure/dn798921.aspx</a:t>
-            </a:r>
-            <a:endParaRPr lang="en-US" sz="1400" dirty="0" smtClean="0"/>
-          </a:p>
-          <a:p>
-            <a:r>
-              <a:rPr lang="en-US" sz="2000" dirty="0" smtClean="0"/>
-              <a:t>Simple Query Syntax - </a:t>
-            </a:r>
-            <a:r>
-              <a:rPr lang="en-US" sz="1400" dirty="0" smtClean="0">
+              <a:t>Application Developer </a:t>
+            </a:r>
+          </a:p>
+          <a:p>
+            <a:r>
+              <a:rPr lang="en-US" sz="3200" dirty="0">
+                <a:solidFill>
+                  <a:schemeClr val="tx1"/>
+                </a:solidFill>
+              </a:rPr>
+              <a:t>Modern </a:t>
+            </a:r>
+            <a:r>
+              <a:rPr lang="en-US" sz="3200" dirty="0" smtClean="0">
+                <a:solidFill>
+                  <a:schemeClr val="tx1"/>
+                </a:solidFill>
+              </a:rPr>
+              <a:t>Applications</a:t>
+            </a:r>
+            <a:endParaRPr lang="en-US" sz="3200" dirty="0">
+              <a:solidFill>
+                <a:schemeClr val="tx1"/>
+              </a:solidFill>
+            </a:endParaRPr>
+          </a:p>
+          <a:p>
+            <a:r>
+              <a:rPr lang="en-US" sz="3200" dirty="0" smtClean="0">
                 <a:hlinkClick r:id="rId3"/>
               </a:rPr>
-              <a:t>https</a:t>
-            </a:r>
-            <a:r>
-              <a:rPr lang="en-US" sz="1400" dirty="0">
-                <a:hlinkClick r:id="rId3"/>
+              <a:t>tim.gabrhel@outlook.com</a:t>
+            </a:r>
+            <a:endParaRPr lang="en-US" sz="3200" dirty="0" smtClean="0"/>
+          </a:p>
+          <a:p>
+            <a:r>
+              <a:rPr lang="en-US" sz="3200" dirty="0" smtClean="0"/>
+              <a:t>@timgabrhel</a:t>
+            </a:r>
+            <a:endParaRPr lang="en-US" sz="3200" dirty="0"/>
+          </a:p>
+        </p:txBody>
+      </p:sp>
+      <p:sp>
+        <p:nvSpPr>
+          <p:cNvPr id="6" name="Rectangle 5"/>
+          <p:cNvSpPr/>
+          <p:nvPr/>
+        </p:nvSpPr>
+        <p:spPr>
+          <a:xfrm>
+            <a:off x="3264562" y="5341182"/>
+            <a:ext cx="7183751" cy="769441"/>
+          </a:xfrm>
+          <a:prstGeom prst="rect">
+            <a:avLst/>
+          </a:prstGeom>
+        </p:spPr>
+        <p:txBody>
+          <a:bodyPr wrap="square">
+            <a:spAutoFit/>
+          </a:bodyPr>
+          <a:lstStyle/>
+          <a:p>
+            <a:pPr algn="r"/>
+            <a:r>
+              <a:rPr lang="en-US" sz="2200" dirty="0">
+                <a:gradFill>
+                  <a:gsLst>
+                    <a:gs pos="1250">
+                      <a:schemeClr val="tx1"/>
+                    </a:gs>
+                    <a:gs pos="99000">
+                      <a:schemeClr val="tx1"/>
+                    </a:gs>
+                  </a:gsLst>
+                  <a:lin ang="5400000" scaled="0"/>
+                </a:gradFill>
+                <a:latin typeface="+mj-lt"/>
               </a:rPr>
-              <a:t>://</a:t>
-            </a:r>
-            <a:r>
-              <a:rPr lang="en-US" sz="1400" dirty="0" smtClean="0">
-                <a:hlinkClick r:id="rId3"/>
-              </a:rPr>
-              <a:t>msdn.microsoft.com/en-us/library/azure/dn798920.aspx</a:t>
-            </a:r>
-            <a:endParaRPr lang="en-US" sz="1400" dirty="0" smtClean="0"/>
-          </a:p>
-          <a:p>
-            <a:r>
-              <a:rPr lang="en-US" sz="2000" dirty="0" smtClean="0"/>
-              <a:t>Suggestions - </a:t>
-            </a:r>
-            <a:r>
-              <a:rPr lang="en-US" sz="1400" dirty="0" smtClean="0">
+              <a:t>Fork it</a:t>
+            </a:r>
+          </a:p>
+          <a:p>
+            <a:pPr algn="r"/>
+            <a:r>
+              <a:rPr lang="en-US" sz="2200" dirty="0">
                 <a:hlinkClick r:id="rId4"/>
               </a:rPr>
-              <a:t>http</a:t>
-            </a:r>
-            <a:r>
-              <a:rPr lang="en-US" sz="1400" dirty="0">
-                <a:hlinkClick r:id="rId4"/>
-              </a:rPr>
-              <a:t>://azure.microsoft.com/blog/2015/01/20/azure-search-how-to-add-suggestions-auto-complete-to-your-search-applications</a:t>
-            </a:r>
-            <a:r>
-              <a:rPr lang="en-US" sz="1400" dirty="0" smtClean="0">
-                <a:hlinkClick r:id="rId4"/>
-              </a:rPr>
-              <a:t>/</a:t>
-            </a:r>
-            <a:endParaRPr lang="en-US" sz="1400" dirty="0" smtClean="0"/>
-          </a:p>
-          <a:p>
-            <a:r>
-              <a:rPr lang="en-US" sz="1800" dirty="0"/>
-              <a:t>Scoring Profiles</a:t>
-            </a:r>
-            <a:r>
-              <a:rPr lang="en-US" sz="1400" dirty="0"/>
-              <a:t> - </a:t>
-            </a:r>
-            <a:r>
-              <a:rPr lang="en-US" sz="1400" dirty="0">
-                <a:hlinkClick r:id="rId5"/>
-              </a:rPr>
-              <a:t>http://azure.microsoft.com/en-us/documentation/articles/search-get-started-scoring-profiles</a:t>
-            </a:r>
-            <a:r>
-              <a:rPr lang="en-US" sz="1400" dirty="0" smtClean="0">
-                <a:hlinkClick r:id="rId5"/>
-              </a:rPr>
-              <a:t>/</a:t>
-            </a:r>
-            <a:endParaRPr lang="en-US" sz="1400" dirty="0" smtClean="0"/>
-          </a:p>
-          <a:p>
-            <a:r>
-              <a:rPr lang="en-US" sz="1800" dirty="0" smtClean="0"/>
-              <a:t>Geospatial - </a:t>
-            </a:r>
-            <a:r>
-              <a:rPr lang="en-US" sz="1400" dirty="0">
-                <a:hlinkClick r:id="rId6"/>
-              </a:rPr>
-              <a:t>http://channel9.msdn.com/Shows/Data-Exposed/Azure-Search-and-Geospatial-Data</a:t>
-            </a:r>
-            <a:endParaRPr lang="en-US" sz="1400" dirty="0" smtClean="0"/>
-          </a:p>
-          <a:p>
-            <a:r>
-              <a:rPr lang="en-US" sz="2000" dirty="0" smtClean="0"/>
-              <a:t>Facets - </a:t>
-            </a:r>
-            <a:r>
-              <a:rPr lang="en-US" sz="1400" dirty="0" smtClean="0">
-                <a:hlinkClick r:id="rId7"/>
-              </a:rPr>
-              <a:t>http://azure.microsoft.com/en-us/documentation/articles/search-faceted-navigation/</a:t>
-            </a:r>
-            <a:endParaRPr lang="en-US" sz="1400" dirty="0" smtClean="0"/>
-          </a:p>
-          <a:p>
-            <a:r>
-              <a:rPr lang="en-US" sz="1800" dirty="0"/>
-              <a:t>Tag Boosting - </a:t>
-            </a:r>
-            <a:r>
-              <a:rPr lang="en-US" sz="1400" dirty="0">
-                <a:hlinkClick r:id="rId8"/>
-              </a:rPr>
-              <a:t>http://</a:t>
-            </a:r>
-            <a:r>
-              <a:rPr lang="en-US" sz="1400" dirty="0" smtClean="0">
-                <a:hlinkClick r:id="rId8"/>
-              </a:rPr>
-              <a:t>azure.microsoft.com/blog/2015/02/05/personalizing-search-results-announcing-tag-boosting-in-azure-search</a:t>
-            </a:r>
-            <a:endParaRPr lang="en-US" sz="1400" dirty="0" smtClean="0"/>
-          </a:p>
-          <a:p>
-            <a:r>
-              <a:rPr lang="en-US" sz="1800" dirty="0" smtClean="0"/>
-              <a:t>Filter Operators - </a:t>
-            </a:r>
-            <a:r>
-              <a:rPr lang="en-US" sz="1400" dirty="0" smtClean="0">
-                <a:hlinkClick r:id="rId3"/>
-              </a:rPr>
-              <a:t>https</a:t>
-            </a:r>
-            <a:r>
-              <a:rPr lang="en-US" sz="1400" dirty="0">
-                <a:hlinkClick r:id="rId3"/>
-              </a:rPr>
-              <a:t>://</a:t>
-            </a:r>
-            <a:r>
-              <a:rPr lang="en-US" sz="1400" dirty="0" smtClean="0">
-                <a:hlinkClick r:id="rId3"/>
-              </a:rPr>
-              <a:t>msdn.microsoft.com/en-us/library/azure/dn798920.aspx</a:t>
-            </a:r>
-            <a:endParaRPr lang="en-US" sz="1400" dirty="0" smtClean="0"/>
-          </a:p>
-          <a:p>
-            <a:r>
-              <a:rPr lang="en-US" sz="1800" dirty="0" smtClean="0"/>
-              <a:t>Data sources - </a:t>
-            </a:r>
-            <a:r>
-              <a:rPr lang="en-US" sz="1400" dirty="0" smtClean="0">
-                <a:hlinkClick r:id="rId9"/>
-              </a:rPr>
-              <a:t>https</a:t>
-            </a:r>
-            <a:r>
-              <a:rPr lang="en-US" sz="1400" dirty="0">
-                <a:hlinkClick r:id="rId9"/>
-              </a:rPr>
-              <a:t>://</a:t>
-            </a:r>
-            <a:r>
-              <a:rPr lang="en-US" sz="1400" dirty="0" smtClean="0">
-                <a:hlinkClick r:id="rId9"/>
-              </a:rPr>
-              <a:t>msdn.microsoft.com/en-us/library/azure/dn946876.aspx</a:t>
-            </a:r>
-            <a:endParaRPr lang="en-US" sz="1400" dirty="0" smtClean="0"/>
-          </a:p>
-          <a:p>
-            <a:r>
-              <a:rPr lang="en-US" sz="1800" dirty="0" smtClean="0"/>
-              <a:t>Azure Search User </a:t>
-            </a:r>
-            <a:r>
-              <a:rPr lang="en-US" sz="1800" dirty="0"/>
-              <a:t>Voice - </a:t>
-            </a:r>
-            <a:r>
-              <a:rPr lang="en-US" sz="1400" dirty="0">
-                <a:hlinkClick r:id="rId10"/>
-              </a:rPr>
-              <a:t>http://</a:t>
-            </a:r>
-            <a:r>
-              <a:rPr lang="en-US" sz="1400" dirty="0" smtClean="0">
-                <a:hlinkClick r:id="rId10"/>
-              </a:rPr>
-              <a:t>feedback.azure.com/forums/263029-azure-search</a:t>
-            </a:r>
-            <a:endParaRPr lang="en-US" sz="1400" dirty="0" smtClean="0"/>
-          </a:p>
-          <a:p>
-            <a:r>
-              <a:rPr lang="en-US" sz="1800" dirty="0" smtClean="0"/>
-              <a:t>Azure Storage Queues -</a:t>
-            </a:r>
-            <a:r>
-              <a:rPr lang="en-US" sz="1400" dirty="0" smtClean="0"/>
-              <a:t> </a:t>
-            </a:r>
-            <a:r>
-              <a:rPr lang="en-US" sz="1400" dirty="0" smtClean="0">
-                <a:hlinkClick r:id="rId11"/>
-              </a:rPr>
-              <a:t>http</a:t>
-            </a:r>
-            <a:r>
-              <a:rPr lang="en-US" sz="1400" dirty="0">
-                <a:hlinkClick r:id="rId11"/>
-              </a:rPr>
-              <a:t>://azure.microsoft.com/en-us/documentation/articles/storage-dotnet-how-to-use-queues</a:t>
-            </a:r>
-            <a:r>
-              <a:rPr lang="en-US" sz="1400" dirty="0" smtClean="0">
-                <a:hlinkClick r:id="rId11"/>
-              </a:rPr>
-              <a:t>/</a:t>
-            </a:r>
-            <a:endParaRPr lang="en-US" sz="1400" dirty="0" smtClean="0"/>
-          </a:p>
-          <a:p>
-            <a:r>
-              <a:rPr lang="en-US" sz="1800" dirty="0" smtClean="0"/>
-              <a:t>Azure Web Jobs &amp; Storage -</a:t>
-            </a:r>
-            <a:r>
-              <a:rPr lang="en-US" sz="1400" dirty="0" smtClean="0"/>
-              <a:t> </a:t>
-            </a:r>
-            <a:r>
-              <a:rPr lang="en-US" sz="1400" dirty="0">
-                <a:hlinkClick r:id="rId12"/>
-              </a:rPr>
-              <a:t>http://</a:t>
-            </a:r>
-            <a:r>
-              <a:rPr lang="en-US" sz="1400" dirty="0" smtClean="0">
-                <a:hlinkClick r:id="rId12"/>
-              </a:rPr>
-              <a:t>azure.microsoft.com/en-us/documentation/articles/websites-dotnet-webjobs-sdk-storage-queues-how-to/</a:t>
-            </a:r>
-            <a:endParaRPr lang="en-US" sz="1400" dirty="0"/>
-          </a:p>
-          <a:p>
-            <a:r>
-              <a:rPr lang="en-US" sz="1800" dirty="0" smtClean="0"/>
-              <a:t>Azure Search .NET SDK -</a:t>
-            </a:r>
-            <a:r>
-              <a:rPr lang="en-US" sz="1400" dirty="0" smtClean="0"/>
-              <a:t> </a:t>
-            </a:r>
-            <a:r>
-              <a:rPr lang="en-US" sz="1400" dirty="0">
-                <a:hlinkClick r:id="rId13"/>
-              </a:rPr>
-              <a:t>http://azure.microsoft.com/en-us/documentation/articles/search-howto-dotnet-sdk</a:t>
-            </a:r>
-            <a:r>
-              <a:rPr lang="en-US" sz="1400" dirty="0" smtClean="0">
-                <a:hlinkClick r:id="rId13"/>
-              </a:rPr>
-              <a:t>/</a:t>
-            </a:r>
-            <a:endParaRPr lang="en-US" sz="1400" dirty="0" smtClean="0"/>
-          </a:p>
-          <a:p>
-            <a:r>
-              <a:rPr lang="en-US" sz="1800" dirty="0"/>
-              <a:t>REST API -</a:t>
-            </a:r>
-            <a:r>
-              <a:rPr lang="en-US" sz="1400" dirty="0"/>
-              <a:t> </a:t>
-            </a:r>
-            <a:r>
-              <a:rPr lang="en-US" sz="1400" dirty="0">
-                <a:hlinkClick r:id="rId14"/>
-              </a:rPr>
-              <a:t>https://</a:t>
-            </a:r>
-            <a:r>
-              <a:rPr lang="en-US" sz="1400" dirty="0" smtClean="0">
-                <a:hlinkClick r:id="rId14"/>
-              </a:rPr>
-              <a:t>msdn.microsoft.com/en-us/library/azure/dn798935.aspx</a:t>
-            </a:r>
-            <a:endParaRPr lang="en-US" sz="1400" dirty="0" smtClean="0"/>
-          </a:p>
-          <a:p>
-            <a:endParaRPr lang="en-US" sz="1400" dirty="0" smtClean="0"/>
-          </a:p>
-          <a:p>
-            <a:endParaRPr lang="en-US" sz="1800" dirty="0"/>
-          </a:p>
-          <a:p>
-            <a:endParaRPr lang="en-US" sz="1800" dirty="0" smtClean="0"/>
-          </a:p>
-        </p:txBody>
-      </p:sp>
+              <a:t>https://github.com/timgabrhel/NewCC2015.AzureSearch</a:t>
+            </a:r>
+            <a:endParaRPr lang="en-US" sz="2200" dirty="0"/>
+          </a:p>
+        </p:txBody>
+      </p:sp>
+      <p:pic>
+        <p:nvPicPr>
+          <p:cNvPr id="7" name="Picture 2" descr="http://amscotti.github.io/advanced-github-workshop/images/github_client.png"/>
+          <p:cNvPicPr>
+            <a:picLocks noChangeAspect="1" noChangeArrowheads="1"/>
+          </p:cNvPicPr>
+          <p:nvPr/>
+        </p:nvPicPr>
+        <p:blipFill>
+          <a:blip r:embed="rId5" cstate="print">
+            <a:extLst>
+              <a:ext uri="{28A0092B-C50C-407E-A947-70E740481C1C}">
+                <a14:useLocalDpi xmlns:a14="http://schemas.microsoft.com/office/drawing/2010/main" val="0"/>
+              </a:ext>
+            </a:extLst>
+          </a:blip>
+          <a:srcRect/>
+          <a:stretch>
+            <a:fillRect/>
+          </a:stretch>
+        </p:blipFill>
+        <p:spPr bwMode="auto">
+          <a:xfrm>
+            <a:off x="10448313" y="4697730"/>
+            <a:ext cx="1474449" cy="1474449"/>
+          </a:xfrm>
+          <a:prstGeom prst="rect">
+            <a:avLst/>
+          </a:prstGeom>
+          <a:noFill/>
+          <a:extLst>
+            <a:ext uri="{909E8E84-426E-40DD-AFC4-6F175D3DCCD1}">
+              <a14:hiddenFill xmlns:a14="http://schemas.microsoft.com/office/drawing/2010/main">
+                <a:solidFill>
+                  <a:srgbClr val="FFFFFF"/>
+                </a:solidFill>
+              </a14:hiddenFill>
+            </a:ext>
+          </a:extLst>
+        </p:spPr>
+      </p:pic>
     </p:spTree>
     <p:extLst>
       <p:ext uri="{BB962C8B-B14F-4D97-AF65-F5344CB8AC3E}">
-        <p14:creationId xmlns:p14="http://schemas.microsoft.com/office/powerpoint/2010/main" val="3408932821"/>
+        <p14:creationId xmlns:p14="http://schemas.microsoft.com/office/powerpoint/2010/main" val="130316731"/>
       </p:ext>
     </p:extLst>
   </p:cSld>
@@ -16481,8 +17163,11 @@
           <a:p>
             <a:r>
               <a:rPr lang="en-US" dirty="0" smtClean="0"/>
-              <a:t>Questions</a:t>
-            </a:r>
+              <a:t>Resources</a:t>
+            </a:r>
+            <a:br>
+              <a:rPr lang="en-US" dirty="0" smtClean="0"/>
+            </a:br>
             <a:endParaRPr lang="en-US" dirty="0"/>
           </a:p>
         </p:txBody>
@@ -16499,8 +17184,8 @@
         </p:nvSpPr>
         <p:spPr>
           <a:xfrm>
-            <a:off x="465884" y="1543138"/>
-            <a:ext cx="10713393" cy="2252924"/>
+            <a:off x="269239" y="1189177"/>
+            <a:ext cx="11653523" cy="5370701"/>
           </a:xfrm>
         </p:spPr>
         <p:txBody>
@@ -16508,131 +17193,321 @@
           <a:lstStyle/>
           <a:p>
             <a:r>
-              <a:rPr lang="en-US" sz="3200" dirty="0" smtClean="0"/>
-              <a:t>Tim Gabrhel</a:t>
-            </a:r>
-          </a:p>
-          <a:p>
-            <a:r>
-              <a:rPr lang="en-US" sz="3200" dirty="0" smtClean="0"/>
-              <a:t>Application Developer</a:t>
-            </a:r>
-          </a:p>
-          <a:p>
-            <a:r>
-              <a:rPr lang="en-US" sz="3200" dirty="0" smtClean="0">
+              <a:rPr lang="en-US" sz="2000" dirty="0" smtClean="0"/>
+              <a:t>OData Expressions - </a:t>
+            </a:r>
+            <a:r>
+              <a:rPr lang="en-US" sz="1400" dirty="0" smtClean="0">
+                <a:hlinkClick r:id="rId2"/>
+              </a:rPr>
+              <a:t>https://msdn.microsoft.com/en-us/library/azure/dn798921.aspx</a:t>
+            </a:r>
+            <a:endParaRPr lang="en-US" sz="1400" dirty="0" smtClean="0"/>
+          </a:p>
+          <a:p>
+            <a:r>
+              <a:rPr lang="en-US" sz="2000" dirty="0" smtClean="0"/>
+              <a:t>Simple Query Syntax - </a:t>
+            </a:r>
+            <a:r>
+              <a:rPr lang="en-US" sz="1400" dirty="0" smtClean="0">
                 <a:hlinkClick r:id="rId3"/>
               </a:rPr>
-              <a:t>tim.gabrhel@outlook.com</a:t>
-            </a:r>
-            <a:endParaRPr lang="en-US" sz="3200" dirty="0" smtClean="0"/>
-          </a:p>
-          <a:p>
-            <a:r>
-              <a:rPr lang="en-US" sz="3200" dirty="0" smtClean="0"/>
-              <a:t>@timgabrhel</a:t>
-            </a:r>
-            <a:endParaRPr lang="en-US" sz="3200" dirty="0"/>
-          </a:p>
-        </p:txBody>
-      </p:sp>
-      <p:sp>
-        <p:nvSpPr>
-          <p:cNvPr id="6" name="Rectangle 5"/>
-          <p:cNvSpPr/>
-          <p:nvPr/>
-        </p:nvSpPr>
-        <p:spPr>
-          <a:xfrm>
-            <a:off x="3264562" y="5341182"/>
-            <a:ext cx="7183751" cy="769441"/>
-          </a:xfrm>
-          <a:prstGeom prst="rect">
-            <a:avLst/>
-          </a:prstGeom>
-        </p:spPr>
-        <p:txBody>
-          <a:bodyPr wrap="square">
-            <a:spAutoFit/>
-          </a:bodyPr>
-          <a:lstStyle/>
-          <a:p>
-            <a:pPr algn="r"/>
-            <a:r>
-              <a:rPr lang="en-US" sz="2200" dirty="0">
-                <a:gradFill>
-                  <a:gsLst>
-                    <a:gs pos="1250">
-                      <a:schemeClr val="tx1"/>
-                    </a:gs>
-                    <a:gs pos="99000">
-                      <a:schemeClr val="tx1"/>
-                    </a:gs>
-                  </a:gsLst>
-                  <a:lin ang="5400000" scaled="0"/>
-                </a:gradFill>
-                <a:latin typeface="+mj-lt"/>
+              <a:t>https</a:t>
+            </a:r>
+            <a:r>
+              <a:rPr lang="en-US" sz="1400" dirty="0">
+                <a:hlinkClick r:id="rId3"/>
               </a:rPr>
-              <a:t>Fork it</a:t>
-            </a:r>
-          </a:p>
-          <a:p>
-            <a:pPr algn="r"/>
-            <a:r>
-              <a:rPr lang="en-US" sz="2200" dirty="0">
+              <a:t>://</a:t>
+            </a:r>
+            <a:r>
+              <a:rPr lang="en-US" sz="1400" dirty="0" smtClean="0">
+                <a:hlinkClick r:id="rId3"/>
+              </a:rPr>
+              <a:t>msdn.microsoft.com/en-us/library/azure/dn798920.aspx</a:t>
+            </a:r>
+            <a:endParaRPr lang="en-US" sz="1400" dirty="0" smtClean="0"/>
+          </a:p>
+          <a:p>
+            <a:r>
+              <a:rPr lang="en-US" sz="2000" dirty="0" smtClean="0"/>
+              <a:t>Suggestions - </a:t>
+            </a:r>
+            <a:r>
+              <a:rPr lang="en-US" sz="1400" dirty="0" smtClean="0">
                 <a:hlinkClick r:id="rId4"/>
               </a:rPr>
-              <a:t>https://github.com/timgabrhel/NewCC2015.AzureSearch</a:t>
-            </a:r>
-            <a:endParaRPr lang="en-US" sz="2200" dirty="0"/>
-          </a:p>
-        </p:txBody>
-      </p:sp>
-      <p:pic>
-        <p:nvPicPr>
-          <p:cNvPr id="7" name="Picture 2" descr="http://amscotti.github.io/advanced-github-workshop/images/github_client.png"/>
-          <p:cNvPicPr>
-            <a:picLocks noChangeAspect="1" noChangeArrowheads="1"/>
-          </p:cNvPicPr>
-          <p:nvPr/>
-        </p:nvPicPr>
-        <p:blipFill>
-          <a:blip r:embed="rId5" cstate="print">
-            <a:extLst>
-              <a:ext uri="{28A0092B-C50C-407E-A947-70E740481C1C}">
-                <a14:useLocalDpi xmlns:a14="http://schemas.microsoft.com/office/drawing/2010/main" val="0"/>
-              </a:ext>
-            </a:extLst>
-          </a:blip>
-          <a:srcRect/>
-          <a:stretch>
-            <a:fillRect/>
-          </a:stretch>
-        </p:blipFill>
-        <p:spPr bwMode="auto">
-          <a:xfrm>
-            <a:off x="10448313" y="4697730"/>
-            <a:ext cx="1474449" cy="1474449"/>
-          </a:xfrm>
-          <a:prstGeom prst="rect">
-            <a:avLst/>
-          </a:prstGeom>
-          <a:noFill/>
-          <a:extLst>
-            <a:ext uri="{909E8E84-426E-40DD-AFC4-6F175D3DCCD1}">
-              <a14:hiddenFill xmlns:a14="http://schemas.microsoft.com/office/drawing/2010/main">
-                <a:solidFill>
-                  <a:srgbClr val="FFFFFF"/>
-                </a:solidFill>
-              </a14:hiddenFill>
-            </a:ext>
-          </a:extLst>
-        </p:spPr>
-      </p:pic>
+              <a:t>http</a:t>
+            </a:r>
+            <a:r>
+              <a:rPr lang="en-US" sz="1400" dirty="0">
+                <a:hlinkClick r:id="rId4"/>
+              </a:rPr>
+              <a:t>://azure.microsoft.com/blog/2015/01/20/azure-search-how-to-add-suggestions-auto-complete-to-your-search-applications</a:t>
+            </a:r>
+            <a:r>
+              <a:rPr lang="en-US" sz="1400" dirty="0" smtClean="0">
+                <a:hlinkClick r:id="rId4"/>
+              </a:rPr>
+              <a:t>/</a:t>
+            </a:r>
+            <a:endParaRPr lang="en-US" sz="1400" dirty="0" smtClean="0"/>
+          </a:p>
+          <a:p>
+            <a:r>
+              <a:rPr lang="en-US" sz="1800" dirty="0"/>
+              <a:t>Scoring Profiles</a:t>
+            </a:r>
+            <a:r>
+              <a:rPr lang="en-US" sz="1400" dirty="0"/>
+              <a:t> - </a:t>
+            </a:r>
+            <a:r>
+              <a:rPr lang="en-US" sz="1400" dirty="0">
+                <a:hlinkClick r:id="rId5"/>
+              </a:rPr>
+              <a:t>http://azure.microsoft.com/en-us/documentation/articles/search-get-started-scoring-profiles</a:t>
+            </a:r>
+            <a:r>
+              <a:rPr lang="en-US" sz="1400" dirty="0" smtClean="0">
+                <a:hlinkClick r:id="rId5"/>
+              </a:rPr>
+              <a:t>/</a:t>
+            </a:r>
+            <a:endParaRPr lang="en-US" sz="1400" dirty="0" smtClean="0"/>
+          </a:p>
+          <a:p>
+            <a:r>
+              <a:rPr lang="en-US" sz="1800" dirty="0" smtClean="0"/>
+              <a:t>Geospatial - </a:t>
+            </a:r>
+            <a:r>
+              <a:rPr lang="en-US" sz="1400" dirty="0">
+                <a:hlinkClick r:id="rId6"/>
+              </a:rPr>
+              <a:t>http://channel9.msdn.com/Shows/Data-Exposed/Azure-Search-and-Geospatial-Data</a:t>
+            </a:r>
+            <a:endParaRPr lang="en-US" sz="1400" dirty="0" smtClean="0"/>
+          </a:p>
+          <a:p>
+            <a:r>
+              <a:rPr lang="en-US" sz="2000" dirty="0" smtClean="0"/>
+              <a:t>Facets - </a:t>
+            </a:r>
+            <a:r>
+              <a:rPr lang="en-US" sz="1400" dirty="0" smtClean="0">
+                <a:hlinkClick r:id="rId7"/>
+              </a:rPr>
+              <a:t>http://azure.microsoft.com/en-us/documentation/articles/search-faceted-navigation/</a:t>
+            </a:r>
+            <a:endParaRPr lang="en-US" sz="1400" dirty="0" smtClean="0"/>
+          </a:p>
+          <a:p>
+            <a:r>
+              <a:rPr lang="en-US" sz="1800" dirty="0"/>
+              <a:t>Tag Boosting - </a:t>
+            </a:r>
+            <a:r>
+              <a:rPr lang="en-US" sz="1400" dirty="0">
+                <a:hlinkClick r:id="rId8"/>
+              </a:rPr>
+              <a:t>http://</a:t>
+            </a:r>
+            <a:r>
+              <a:rPr lang="en-US" sz="1400" dirty="0" smtClean="0">
+                <a:hlinkClick r:id="rId8"/>
+              </a:rPr>
+              <a:t>azure.microsoft.com/blog/2015/02/05/personalizing-search-results-announcing-tag-boosting-in-azure-search</a:t>
+            </a:r>
+            <a:endParaRPr lang="en-US" sz="1400" dirty="0" smtClean="0"/>
+          </a:p>
+          <a:p>
+            <a:r>
+              <a:rPr lang="en-US" sz="1800" dirty="0" smtClean="0"/>
+              <a:t>Filter Operators - </a:t>
+            </a:r>
+            <a:r>
+              <a:rPr lang="en-US" sz="1400" dirty="0" smtClean="0">
+                <a:hlinkClick r:id="rId3"/>
+              </a:rPr>
+              <a:t>https</a:t>
+            </a:r>
+            <a:r>
+              <a:rPr lang="en-US" sz="1400" dirty="0">
+                <a:hlinkClick r:id="rId3"/>
+              </a:rPr>
+              <a:t>://</a:t>
+            </a:r>
+            <a:r>
+              <a:rPr lang="en-US" sz="1400" dirty="0" smtClean="0">
+                <a:hlinkClick r:id="rId3"/>
+              </a:rPr>
+              <a:t>msdn.microsoft.com/en-us/library/azure/dn798920.aspx</a:t>
+            </a:r>
+            <a:endParaRPr lang="en-US" sz="1400" dirty="0" smtClean="0"/>
+          </a:p>
+          <a:p>
+            <a:r>
+              <a:rPr lang="en-US" sz="1800" dirty="0" smtClean="0"/>
+              <a:t>Data sources - </a:t>
+            </a:r>
+            <a:r>
+              <a:rPr lang="en-US" sz="1400" dirty="0" smtClean="0">
+                <a:hlinkClick r:id="rId9"/>
+              </a:rPr>
+              <a:t>https</a:t>
+            </a:r>
+            <a:r>
+              <a:rPr lang="en-US" sz="1400" dirty="0">
+                <a:hlinkClick r:id="rId9"/>
+              </a:rPr>
+              <a:t>://</a:t>
+            </a:r>
+            <a:r>
+              <a:rPr lang="en-US" sz="1400" dirty="0" smtClean="0">
+                <a:hlinkClick r:id="rId9"/>
+              </a:rPr>
+              <a:t>msdn.microsoft.com/en-us/library/azure/dn946876.aspx</a:t>
+            </a:r>
+            <a:endParaRPr lang="en-US" sz="1400" dirty="0" smtClean="0"/>
+          </a:p>
+          <a:p>
+            <a:r>
+              <a:rPr lang="en-US" sz="1800" dirty="0" smtClean="0"/>
+              <a:t>Azure Search User </a:t>
+            </a:r>
+            <a:r>
+              <a:rPr lang="en-US" sz="1800" dirty="0"/>
+              <a:t>Voice - </a:t>
+            </a:r>
+            <a:r>
+              <a:rPr lang="en-US" sz="1400" dirty="0">
+                <a:hlinkClick r:id="rId10"/>
+              </a:rPr>
+              <a:t>http://</a:t>
+            </a:r>
+            <a:r>
+              <a:rPr lang="en-US" sz="1400" dirty="0" smtClean="0">
+                <a:hlinkClick r:id="rId10"/>
+              </a:rPr>
+              <a:t>feedback.azure.com/forums/263029-azure-search</a:t>
+            </a:r>
+            <a:endParaRPr lang="en-US" sz="1400" dirty="0" smtClean="0"/>
+          </a:p>
+          <a:p>
+            <a:r>
+              <a:rPr lang="en-US" sz="1800" dirty="0" smtClean="0"/>
+              <a:t>Azure Storage Queues -</a:t>
+            </a:r>
+            <a:r>
+              <a:rPr lang="en-US" sz="1400" dirty="0" smtClean="0"/>
+              <a:t> </a:t>
+            </a:r>
+            <a:r>
+              <a:rPr lang="en-US" sz="1400" dirty="0" smtClean="0">
+                <a:hlinkClick r:id="rId11"/>
+              </a:rPr>
+              <a:t>http</a:t>
+            </a:r>
+            <a:r>
+              <a:rPr lang="en-US" sz="1400" dirty="0">
+                <a:hlinkClick r:id="rId11"/>
+              </a:rPr>
+              <a:t>://azure.microsoft.com/en-us/documentation/articles/storage-dotnet-how-to-use-queues</a:t>
+            </a:r>
+            <a:r>
+              <a:rPr lang="en-US" sz="1400" dirty="0" smtClean="0">
+                <a:hlinkClick r:id="rId11"/>
+              </a:rPr>
+              <a:t>/</a:t>
+            </a:r>
+            <a:endParaRPr lang="en-US" sz="1400" dirty="0" smtClean="0"/>
+          </a:p>
+          <a:p>
+            <a:r>
+              <a:rPr lang="en-US" sz="1800" dirty="0" smtClean="0"/>
+              <a:t>Azure Web Jobs &amp; Storage -</a:t>
+            </a:r>
+            <a:r>
+              <a:rPr lang="en-US" sz="1400" dirty="0" smtClean="0"/>
+              <a:t> </a:t>
+            </a:r>
+            <a:r>
+              <a:rPr lang="en-US" sz="1400" dirty="0">
+                <a:hlinkClick r:id="rId12"/>
+              </a:rPr>
+              <a:t>http://</a:t>
+            </a:r>
+            <a:r>
+              <a:rPr lang="en-US" sz="1400" dirty="0" smtClean="0">
+                <a:hlinkClick r:id="rId12"/>
+              </a:rPr>
+              <a:t>azure.microsoft.com/en-us/documentation/articles/websites-dotnet-webjobs-sdk-storage-queues-how-to/</a:t>
+            </a:r>
+            <a:endParaRPr lang="en-US" sz="1400" dirty="0"/>
+          </a:p>
+          <a:p>
+            <a:r>
+              <a:rPr lang="en-US" sz="1800" dirty="0" smtClean="0"/>
+              <a:t>Azure Search .NET SDK -</a:t>
+            </a:r>
+            <a:r>
+              <a:rPr lang="en-US" sz="1400" dirty="0" smtClean="0"/>
+              <a:t> </a:t>
+            </a:r>
+            <a:r>
+              <a:rPr lang="en-US" sz="1400" dirty="0">
+                <a:hlinkClick r:id="rId13"/>
+              </a:rPr>
+              <a:t>http://azure.microsoft.com/en-us/documentation/articles/search-howto-dotnet-sdk</a:t>
+            </a:r>
+            <a:r>
+              <a:rPr lang="en-US" sz="1400" dirty="0" smtClean="0">
+                <a:hlinkClick r:id="rId13"/>
+              </a:rPr>
+              <a:t>/</a:t>
+            </a:r>
+            <a:endParaRPr lang="en-US" sz="1400" dirty="0" smtClean="0"/>
+          </a:p>
+          <a:p>
+            <a:r>
+              <a:rPr lang="en-US" sz="1800" dirty="0"/>
+              <a:t>REST API -</a:t>
+            </a:r>
+            <a:r>
+              <a:rPr lang="en-US" sz="1400" dirty="0"/>
+              <a:t> </a:t>
+            </a:r>
+            <a:r>
+              <a:rPr lang="en-US" sz="1400" dirty="0">
+                <a:hlinkClick r:id="rId14"/>
+              </a:rPr>
+              <a:t>https://</a:t>
+            </a:r>
+            <a:r>
+              <a:rPr lang="en-US" sz="1400" dirty="0" smtClean="0">
+                <a:hlinkClick r:id="rId14"/>
+              </a:rPr>
+              <a:t>msdn.microsoft.com/en-us/library/azure/dn798935.aspx</a:t>
+            </a:r>
+            <a:endParaRPr lang="en-US" sz="1400" dirty="0" smtClean="0"/>
+          </a:p>
+          <a:p>
+            <a:endParaRPr lang="en-US" sz="1400" dirty="0" smtClean="0"/>
+          </a:p>
+          <a:p>
+            <a:endParaRPr lang="en-US" sz="1800" dirty="0"/>
+          </a:p>
+          <a:p>
+            <a:endParaRPr lang="en-US" sz="1800" dirty="0" smtClean="0"/>
+          </a:p>
+        </p:txBody>
+      </p:sp>
     </p:spTree>
     <p:extLst>
       <p:ext uri="{BB962C8B-B14F-4D97-AF65-F5344CB8AC3E}">
-        <p14:creationId xmlns:p14="http://schemas.microsoft.com/office/powerpoint/2010/main" val="130316731"/>
+        <p14:creationId xmlns:p14="http://schemas.microsoft.com/office/powerpoint/2010/main" val="3408932821"/>
       </p:ext>
     </p:extLst>
   </p:cSld>
@@ -16829,6 +17704,103 @@
 </p:sld>
 </file>
 
+<file path=ppt/slides/slide20.xml><?xml version="1.0" encoding="utf-8"?>
+<p:sld xmlns:a="http://schemas.openxmlformats.org/drawingml/2006/main" xmlns:r="http://schemas.openxmlformats.org/officeDocument/2006/relationships" xmlns:p="http://schemas.openxmlformats.org/presentationml/2006/main">
+  <p:cSld>
+    <p:spTree>
+      <p:nvGrpSpPr>
+        <p:cNvPr id="1" name=""/>
+        <p:cNvGrpSpPr/>
+        <p:nvPr/>
+      </p:nvGrpSpPr>
+      <p:grpSpPr>
+        <a:xfrm>
+          <a:off x="0" y="0"/>
+          <a:ext cx="0" cy="0"/>
+          <a:chOff x="0" y="0"/>
+          <a:chExt cx="0" cy="0"/>
+        </a:xfrm>
+      </p:grpSpPr>
+      <p:sp>
+        <p:nvSpPr>
+          <p:cNvPr id="2" name="Title 1"/>
+          <p:cNvSpPr>
+            <a:spLocks noGrp="1"/>
+          </p:cNvSpPr>
+          <p:nvPr>
+            <p:ph type="title"/>
+          </p:nvPr>
+        </p:nvSpPr>
+        <p:spPr/>
+        <p:txBody>
+          <a:bodyPr/>
+          <a:lstStyle/>
+          <a:p>
+            <a:r>
+              <a:rPr lang="en-US" dirty="0" smtClean="0"/>
+              <a:t> </a:t>
+            </a:r>
+            <a:endParaRPr lang="en-US" dirty="0"/>
+          </a:p>
+        </p:txBody>
+      </p:sp>
+      <p:sp>
+        <p:nvSpPr>
+          <p:cNvPr id="3" name="Text Placeholder 2"/>
+          <p:cNvSpPr>
+            <a:spLocks noGrp="1"/>
+          </p:cNvSpPr>
+          <p:nvPr>
+            <p:ph type="body" sz="quarter" idx="10"/>
+          </p:nvPr>
+        </p:nvSpPr>
+        <p:spPr>
+          <a:xfrm>
+            <a:off x="269239" y="1189177"/>
+            <a:ext cx="11653523" cy="2718821"/>
+          </a:xfrm>
+        </p:spPr>
+        <p:txBody>
+          <a:bodyPr/>
+          <a:lstStyle/>
+          <a:p>
+            <a:pPr algn="ctr"/>
+            <a:endParaRPr lang="en-US" dirty="0" smtClean="0"/>
+          </a:p>
+          <a:p>
+            <a:pPr algn="ctr"/>
+            <a:endParaRPr lang="en-US" dirty="0"/>
+          </a:p>
+          <a:p>
+            <a:pPr algn="ctr"/>
+            <a:endParaRPr lang="en-US" dirty="0" smtClean="0"/>
+          </a:p>
+          <a:p>
+            <a:pPr algn="ctr"/>
+            <a:r>
+              <a:rPr lang="en-US" dirty="0" smtClean="0"/>
+              <a:t>Thank you</a:t>
+            </a:r>
+            <a:endParaRPr lang="en-US" dirty="0"/>
+          </a:p>
+        </p:txBody>
+      </p:sp>
+    </p:spTree>
+    <p:extLst>
+      <p:ext uri="{BB962C8B-B14F-4D97-AF65-F5344CB8AC3E}">
+        <p14:creationId xmlns:p14="http://schemas.microsoft.com/office/powerpoint/2010/main" val="3343552869"/>
+      </p:ext>
+    </p:extLst>
+  </p:cSld>
+  <p:clrMapOvr>
+    <a:masterClrMapping/>
+  </p:clrMapOvr>
+  <p:transition>
+    <p:fade/>
+  </p:transition>
+</p:sld>
+</file>
+
 <file path=ppt/slides/slide3.xml><?xml version="1.0" encoding="utf-8"?>
 <p:sld xmlns:a="http://schemas.openxmlformats.org/drawingml/2006/main" xmlns:r="http://schemas.openxmlformats.org/officeDocument/2006/relationships" xmlns:p="http://schemas.openxmlformats.org/presentationml/2006/main">
   <p:cSld>
@@ -16932,7 +17904,7 @@
             </a:pPr>
             <a:r>
               <a:rPr lang="en-US" sz="3400" dirty="0" smtClean="0"/>
-              <a:t>Aggregated results don’t convey the right meaning</a:t>
+              <a:t>Aggregated results may not be accurate</a:t>
             </a:r>
           </a:p>
           <a:p>
@@ -17083,8 +18055,12 @@
               <a:buChar char="•"/>
             </a:pPr>
             <a:r>
+              <a:rPr lang="en-US" sz="3400" dirty="0"/>
+              <a:t>Push or Pull data into </a:t>
+            </a:r>
+            <a:r>
               <a:rPr lang="en-US" sz="3400" dirty="0" smtClean="0"/>
-              <a:t>.NET &amp; REST APIs</a:t>
+              <a:t>Search</a:t>
             </a:r>
           </a:p>
           <a:p>
@@ -17094,7 +18070,7 @@
             </a:pPr>
             <a:r>
               <a:rPr lang="en-US" sz="3400" dirty="0" smtClean="0"/>
-              <a:t>Push or Pull data into Search</a:t>
+              <a:t>.NET SDK &amp; REST APIs</a:t>
             </a:r>
           </a:p>
           <a:p>
@@ -17216,7 +18192,7 @@
         <p:spPr>
           <a:xfrm>
             <a:off x="269240" y="1189176"/>
-            <a:ext cx="6986584" cy="1806648"/>
+            <a:ext cx="6986584" cy="2853089"/>
           </a:xfrm>
         </p:spPr>
         <p:txBody>
@@ -17239,7 +18215,7 @@
             </a:pPr>
             <a:r>
               <a:rPr lang="en-US" sz="3400" dirty="0" smtClean="0"/>
-              <a:t>Suggests terms matching input</a:t>
+              <a:t>Suggests terms and results matching input</a:t>
             </a:r>
           </a:p>
           <a:p>
@@ -17250,6 +18226,16 @@
             <a:r>
               <a:rPr lang="en-US" sz="3400" dirty="0" smtClean="0"/>
               <a:t>Prefix &amp; Infix matching</a:t>
+            </a:r>
+          </a:p>
+          <a:p>
+            <a:pPr marL="571500" indent="-571500">
+              <a:buFont typeface="Arial" panose="020B0604020202020204" pitchFamily="34" charset="0"/>
+              <a:buChar char="•"/>
+            </a:pPr>
+            <a:r>
+              <a:rPr lang="en-US" sz="3400" dirty="0" smtClean="0"/>
+              <a:t>Fuzzy matching</a:t>
             </a:r>
             <a:endParaRPr lang="en-US" sz="3400" dirty="0"/>
           </a:p>
@@ -17264,7 +18250,7 @@
           <p:nvPr/>
         </p:nvPicPr>
         <p:blipFill>
-          <a:blip r:embed="rId2">
+          <a:blip r:embed="rId3">
             <a:extLst>
               <a:ext uri="{28A0092B-C50C-407E-A947-70E740481C1C}">
                 <a14:useLocalDpi xmlns:a14="http://schemas.microsoft.com/office/drawing/2010/main" val="0"/>
@@ -17429,7 +18415,7 @@
           <p:nvPr/>
         </p:nvPicPr>
         <p:blipFill>
-          <a:blip r:embed="rId2">
+          <a:blip r:embed="rId3">
             <a:extLst>
               <a:ext uri="{28A0092B-C50C-407E-A947-70E740481C1C}">
                 <a14:useLocalDpi xmlns:a14="http://schemas.microsoft.com/office/drawing/2010/main" val="0"/>
@@ -17537,7 +18523,7 @@
         <p:spPr>
           <a:xfrm>
             <a:off x="269239" y="1189177"/>
-            <a:ext cx="11653523" cy="1231106"/>
+            <a:ext cx="11653523" cy="1806648"/>
           </a:xfrm>
         </p:spPr>
         <p:txBody>
@@ -17561,6 +18547,16 @@
             <a:r>
               <a:rPr lang="en-US" sz="3400" dirty="0" smtClean="0"/>
               <a:t>Assists user while eye scanning results</a:t>
+            </a:r>
+          </a:p>
+          <a:p>
+            <a:pPr marL="457200" indent="-457200">
+              <a:buFont typeface="Arial" panose="020B0604020202020204" pitchFamily="34" charset="0"/>
+              <a:buChar char="•"/>
+            </a:pPr>
+            <a:r>
+              <a:rPr lang="en-US" sz="3400" dirty="0" smtClean="0"/>
+              <a:t>Supply custom pre &amp; post fix characters around highlights</a:t>
             </a:r>
             <a:endParaRPr lang="en-US" sz="3400" dirty="0"/>
           </a:p>
@@ -17575,7 +18571,7 @@
           <p:nvPr/>
         </p:nvPicPr>
         <p:blipFill>
-          <a:blip r:embed="rId2">
+          <a:blip r:embed="rId3">
             <a:extLst>
               <a:ext uri="{28A0092B-C50C-407E-A947-70E740481C1C}">
                 <a14:useLocalDpi xmlns:a14="http://schemas.microsoft.com/office/drawing/2010/main" val="0"/>
@@ -17917,7 +18913,7 @@
           <a:p>
             <a:r>
               <a:rPr lang="en-US" sz="2800" dirty="0" smtClean="0"/>
-              <a:t>Examples</a:t>
+              <a:t>Examples – Hotel Search</a:t>
             </a:r>
           </a:p>
           <a:p>
@@ -17933,9 +18929,20 @@
           <a:p>
             <a:r>
               <a:rPr lang="en-US" sz="2000" dirty="0"/>
-              <a:t>$filter=(category eq 'Luxury' or parkingIncluded eq true) and rating eq </a:t>
-            </a:r>
-            <a:endParaRPr lang="en-US" sz="2000" dirty="0" smtClean="0"/>
+              <a:t>$filter=(category eq 'Luxury' or parkingIncluded eq true) and rating </a:t>
+            </a:r>
+            <a:r>
+              <a:rPr lang="en-US" sz="2000" dirty="0" err="1"/>
+              <a:t>eq</a:t>
+            </a:r>
+            <a:r>
+              <a:rPr lang="en-US" sz="2000" dirty="0"/>
+              <a:t> </a:t>
+            </a:r>
+            <a:r>
+              <a:rPr lang="en-US" sz="2000" dirty="0" smtClean="0"/>
+              <a:t>3</a:t>
+            </a:r>
           </a:p>
           <a:p>
             <a:r>
@@ -19086,21 +20093,6 @@
 </file>
 
 <file path=customXml/item1.xml><?xml version="1.0" encoding="utf-8"?>
-<?mso-contentType ?>
-<FormTemplates xmlns="http://schemas.microsoft.com/sharepoint/v3/contenttype/forms">
-  <Display>DocumentLibraryForm</Display>
-  <Edit>DocumentLibraryForm</Edit>
-  <New>DocumentLibraryForm</New>
-</FormTemplates>
-</file>
-
-<file path=customXml/item2.xml><?xml version="1.0" encoding="utf-8"?>
-<p:properties xmlns:p="http://schemas.microsoft.com/office/2006/metadata/properties" xmlns:xsi="http://www.w3.org/2001/XMLSchema-instance" xmlns:pc="http://schemas.microsoft.com/office/infopath/2007/PartnerControls">
-  <documentManagement/>
-</p:properties>
-</file>
-
-<file path=customXml/item3.xml><?xml version="1.0" encoding="utf-8"?>
 <ct:contentTypeSchema xmlns:ct="http://schemas.microsoft.com/office/2006/metadata/contentType" xmlns:ma="http://schemas.microsoft.com/office/2006/metadata/properties/metaAttributes" ct:_="" ma:_="" ma:contentTypeName="Document" ma:contentTypeID="0x010100DCE9F88965A517489760119D96480A98" ma:contentTypeVersion="1" ma:contentTypeDescription="Create a new document." ma:contentTypeScope="" ma:versionID="7429fb8f016a936029ec4c8986c11fef">
   <xsd:schema xmlns:xsd="http://www.w3.org/2001/XMLSchema" xmlns:xs="http://www.w3.org/2001/XMLSchema" xmlns:p="http://schemas.microsoft.com/office/2006/metadata/properties" xmlns:ns3="2dbd31e8-e70b-4992-b9a5-74a5ae8df1a6" targetNamespace="http://schemas.microsoft.com/office/2006/metadata/properties" ma:root="true" ma:fieldsID="5d625f2824b5bebcc645f8016a241dd1" ns3:_="">
     <xsd:import namespace="2dbd31e8-e70b-4992-b9a5-74a5ae8df1a6"/>
@@ -19240,31 +20232,22 @@
 </ct:contentTypeSchema>
 </file>
 
-<file path=customXml/itemProps1.xml><?xml version="1.0" encoding="utf-8"?>
-<ds:datastoreItem xmlns:ds="http://schemas.openxmlformats.org/officeDocument/2006/customXml" ds:itemID="{735F59DE-BE51-4FE6-8F6F-DCC85D8D8750}">
-  <ds:schemaRefs>
-    <ds:schemaRef ds:uri="http://schemas.microsoft.com/sharepoint/v3/contenttype/forms"/>
-  </ds:schemaRefs>
-</ds:datastoreItem>
+<file path=customXml/item2.xml><?xml version="1.0" encoding="utf-8"?>
+<?mso-contentType ?>
+<FormTemplates xmlns="http://schemas.microsoft.com/sharepoint/v3/contenttype/forms">
+  <Display>DocumentLibraryForm</Display>
+  <Edit>DocumentLibraryForm</Edit>
+  <New>DocumentLibraryForm</New>
+</FormTemplates>
 </file>
 
-<file path=customXml/itemProps2.xml><?xml version="1.0" encoding="utf-8"?>
-<ds:datastoreItem xmlns:ds="http://schemas.openxmlformats.org/officeDocument/2006/customXml" ds:itemID="{82F97589-A0D2-4C9B-92A2-6682BF753D9D}">
-  <ds:schemaRefs>
-    <ds:schemaRef ds:uri="http://schemas.microsoft.com/office/2006/documentManagement/types"/>
-    <ds:schemaRef ds:uri="http://schemas.microsoft.com/office/infopath/2007/PartnerControls"/>
-    <ds:schemaRef ds:uri="http://purl.org/dc/elements/1.1/"/>
-    <ds:schemaRef ds:uri="2dbd31e8-e70b-4992-b9a5-74a5ae8df1a6"/>
-    <ds:schemaRef ds:uri="http://purl.org/dc/terms/"/>
-    <ds:schemaRef ds:uri="http://schemas.microsoft.com/office/2006/metadata/properties"/>
-    <ds:schemaRef ds:uri="http://schemas.openxmlformats.org/package/2006/metadata/core-properties"/>
-    <ds:schemaRef ds:uri="http://www.w3.org/XML/1998/namespace"/>
-    <ds:schemaRef ds:uri="http://purl.org/dc/dcmitype/"/>
-  </ds:schemaRefs>
-</ds:datastoreItem>
+<file path=customXml/item3.xml><?xml version="1.0" encoding="utf-8"?>
+<p:properties xmlns:p="http://schemas.microsoft.com/office/2006/metadata/properties" xmlns:xsi="http://www.w3.org/2001/XMLSchema-instance" xmlns:pc="http://schemas.microsoft.com/office/infopath/2007/PartnerControls">
+  <documentManagement/>
+</p:properties>
 </file>
 
-<file path=customXml/itemProps3.xml><?xml version="1.0" encoding="utf-8"?>
+<file path=customXml/itemProps1.xml><?xml version="1.0" encoding="utf-8"?>
 <ds:datastoreItem xmlns:ds="http://schemas.openxmlformats.org/officeDocument/2006/customXml" ds:itemID="{F2CF55E3-0DAB-497E-946F-F5731120BFBC}">
   <ds:schemaRefs>
     <ds:schemaRef ds:uri="http://schemas.microsoft.com/office/2006/metadata/contentType"/>
@@ -19280,4 +20263,28 @@
     <ds:schemaRef ds:uri="http://schemas.microsoft.com/internal/obd"/>
   </ds:schemaRefs>
 </ds:datastoreItem>
+</file>
+
+<file path=customXml/itemProps2.xml><?xml version="1.0" encoding="utf-8"?>
+<ds:datastoreItem xmlns:ds="http://schemas.openxmlformats.org/officeDocument/2006/customXml" ds:itemID="{735F59DE-BE51-4FE6-8F6F-DCC85D8D8750}">
+  <ds:schemaRefs>
+    <ds:schemaRef ds:uri="http://schemas.microsoft.com/sharepoint/v3/contenttype/forms"/>
+  </ds:schemaRefs>
+</ds:datastoreItem>
+</file>
+
+<file path=customXml/itemProps3.xml><?xml version="1.0" encoding="utf-8"?>
+<ds:datastoreItem xmlns:ds="http://schemas.openxmlformats.org/officeDocument/2006/customXml" ds:itemID="{82F97589-A0D2-4C9B-92A2-6682BF753D9D}">
+  <ds:schemaRefs>
+    <ds:schemaRef ds:uri="http://schemas.microsoft.com/office/2006/documentManagement/types"/>
+    <ds:schemaRef ds:uri="http://schemas.microsoft.com/office/infopath/2007/PartnerControls"/>
+    <ds:schemaRef ds:uri="http://purl.org/dc/elements/1.1/"/>
+    <ds:schemaRef ds:uri="2dbd31e8-e70b-4992-b9a5-74a5ae8df1a6"/>
+    <ds:schemaRef ds:uri="http://purl.org/dc/terms/"/>
+    <ds:schemaRef ds:uri="http://schemas.microsoft.com/office/2006/metadata/properties"/>
+    <ds:schemaRef ds:uri="http://schemas.openxmlformats.org/package/2006/metadata/core-properties"/>
+    <ds:schemaRef ds:uri="http://www.w3.org/XML/1998/namespace"/>
+    <ds:schemaRef ds:uri="http://purl.org/dc/dcmitype/"/>
+  </ds:schemaRefs>
+</ds:datastoreItem>
 </file>
</xml_diff>